<commit_message>
Module 3 - Add slide with teachers
</commit_message>
<xml_diff>
--- a/module3/session1/class1-part1-introduction.pptx
+++ b/module3/session1/class1-part1-introduction.pptx
@@ -5,46 +5,47 @@
     <p:sldMasterId id="2147483648" r:id="rId1"/>
   </p:sldMasterIdLst>
   <p:notesMasterIdLst>
-    <p:notesMasterId r:id="rId39"/>
+    <p:notesMasterId r:id="rId40"/>
   </p:notesMasterIdLst>
   <p:sldIdLst>
     <p:sldId id="256" r:id="rId2"/>
     <p:sldId id="257" r:id="rId3"/>
-    <p:sldId id="393" r:id="rId4"/>
-    <p:sldId id="258" r:id="rId5"/>
-    <p:sldId id="384" r:id="rId6"/>
-    <p:sldId id="385" r:id="rId7"/>
-    <p:sldId id="386" r:id="rId8"/>
-    <p:sldId id="387" r:id="rId9"/>
-    <p:sldId id="390" r:id="rId10"/>
-    <p:sldId id="260" r:id="rId11"/>
-    <p:sldId id="389" r:id="rId12"/>
-    <p:sldId id="262" r:id="rId13"/>
-    <p:sldId id="394" r:id="rId14"/>
-    <p:sldId id="396" r:id="rId15"/>
-    <p:sldId id="397" r:id="rId16"/>
-    <p:sldId id="402" r:id="rId17"/>
-    <p:sldId id="400" r:id="rId18"/>
-    <p:sldId id="403" r:id="rId19"/>
-    <p:sldId id="404" r:id="rId20"/>
-    <p:sldId id="271" r:id="rId21"/>
-    <p:sldId id="272" r:id="rId22"/>
-    <p:sldId id="273" r:id="rId23"/>
-    <p:sldId id="274" r:id="rId24"/>
-    <p:sldId id="291" r:id="rId25"/>
-    <p:sldId id="276" r:id="rId26"/>
-    <p:sldId id="293" r:id="rId27"/>
-    <p:sldId id="294" r:id="rId28"/>
-    <p:sldId id="295" r:id="rId29"/>
-    <p:sldId id="296" r:id="rId30"/>
-    <p:sldId id="300" r:id="rId31"/>
-    <p:sldId id="297" r:id="rId32"/>
-    <p:sldId id="301" r:id="rId33"/>
-    <p:sldId id="408" r:id="rId34"/>
-    <p:sldId id="406" r:id="rId35"/>
-    <p:sldId id="407" r:id="rId36"/>
-    <p:sldId id="409" r:id="rId37"/>
-    <p:sldId id="391" r:id="rId38"/>
+    <p:sldId id="410" r:id="rId4"/>
+    <p:sldId id="393" r:id="rId5"/>
+    <p:sldId id="258" r:id="rId6"/>
+    <p:sldId id="384" r:id="rId7"/>
+    <p:sldId id="385" r:id="rId8"/>
+    <p:sldId id="386" r:id="rId9"/>
+    <p:sldId id="387" r:id="rId10"/>
+    <p:sldId id="390" r:id="rId11"/>
+    <p:sldId id="260" r:id="rId12"/>
+    <p:sldId id="389" r:id="rId13"/>
+    <p:sldId id="262" r:id="rId14"/>
+    <p:sldId id="394" r:id="rId15"/>
+    <p:sldId id="396" r:id="rId16"/>
+    <p:sldId id="397" r:id="rId17"/>
+    <p:sldId id="402" r:id="rId18"/>
+    <p:sldId id="400" r:id="rId19"/>
+    <p:sldId id="403" r:id="rId20"/>
+    <p:sldId id="404" r:id="rId21"/>
+    <p:sldId id="271" r:id="rId22"/>
+    <p:sldId id="272" r:id="rId23"/>
+    <p:sldId id="273" r:id="rId24"/>
+    <p:sldId id="274" r:id="rId25"/>
+    <p:sldId id="291" r:id="rId26"/>
+    <p:sldId id="276" r:id="rId27"/>
+    <p:sldId id="293" r:id="rId28"/>
+    <p:sldId id="294" r:id="rId29"/>
+    <p:sldId id="295" r:id="rId30"/>
+    <p:sldId id="296" r:id="rId31"/>
+    <p:sldId id="300" r:id="rId32"/>
+    <p:sldId id="297" r:id="rId33"/>
+    <p:sldId id="301" r:id="rId34"/>
+    <p:sldId id="408" r:id="rId35"/>
+    <p:sldId id="406" r:id="rId36"/>
+    <p:sldId id="407" r:id="rId37"/>
+    <p:sldId id="409" r:id="rId38"/>
+    <p:sldId id="391" r:id="rId39"/>
   </p:sldIdLst>
   <p:sldSz cx="12204700" cy="6870700"/>
   <p:notesSz cx="12204700" cy="6870700"/>
@@ -293,7 +294,7 @@
           <a:p>
             <a:fld id="{7F907C1E-5991-4D5E-93DD-5EBE0BD492F7}" type="datetimeFigureOut">
               <a:rPr lang="en-US" smtClean="0"/>
-              <a:t>7/14/2021</a:t>
+              <a:t>2/16/2022</a:t>
             </a:fld>
             <a:endParaRPr lang="en-US"/>
           </a:p>
@@ -451,7 +452,7 @@
           <a:p>
             <a:fld id="{C80385D3-16B1-4673-A7B7-24CB872C9282}" type="slidenum">
               <a:rPr lang="en-US" smtClean="0"/>
-              <a:t>‹#›</a:t>
+              <a:t>‹N°›</a:t>
             </a:fld>
             <a:endParaRPr lang="en-US"/>
           </a:p>
@@ -625,7 +626,7 @@
           <a:p>
             <a:fld id="{C80385D3-16B1-4673-A7B7-24CB872C9282}" type="slidenum">
               <a:rPr lang="en-US" smtClean="0"/>
-              <a:t>16</a:t>
+              <a:t>17</a:t>
             </a:fld>
             <a:endParaRPr lang="en-US"/>
           </a:p>
@@ -709,7 +710,7 @@
           <a:p>
             <a:fld id="{C80385D3-16B1-4673-A7B7-24CB872C9282}" type="slidenum">
               <a:rPr lang="en-US" smtClean="0"/>
-              <a:t>19</a:t>
+              <a:t>20</a:t>
             </a:fld>
             <a:endParaRPr lang="en-US"/>
           </a:p>
@@ -871,7 +872,7 @@
           <a:p>
             <a:fld id="{1D8BD707-D9CF-40AE-B4C6-C98DA3205C09}" type="datetimeFigureOut">
               <a:rPr lang="en-US"/>
-              <a:t>7/14/2021</a:t>
+              <a:t>2/16/2022</a:t>
             </a:fld>
             <a:endParaRPr lang="en-US"/>
           </a:p>
@@ -903,7 +904,7 @@
           </a:lstStyle>
           <a:p>
             <a:fld id="{B6F15528-21DE-4FAA-801E-634DDDAF4B2B}" type="slidenum">
-              <a:t>‹#›</a:t>
+              <a:t>‹N°›</a:t>
             </a:fld>
             <a:endParaRPr/>
           </a:p>
@@ -1048,7 +1049,7 @@
           <a:p>
             <a:fld id="{1D8BD707-D9CF-40AE-B4C6-C98DA3205C09}" type="datetimeFigureOut">
               <a:rPr lang="en-US"/>
-              <a:t>7/14/2021</a:t>
+              <a:t>2/16/2022</a:t>
             </a:fld>
             <a:endParaRPr lang="en-US"/>
           </a:p>
@@ -1080,7 +1081,7 @@
           </a:lstStyle>
           <a:p>
             <a:fld id="{B6F15528-21DE-4FAA-801E-634DDDAF4B2B}" type="slidenum">
-              <a:t>‹#›</a:t>
+              <a:t>‹N°›</a:t>
             </a:fld>
             <a:endParaRPr/>
           </a:p>
@@ -1268,7 +1269,7 @@
           <a:p>
             <a:fld id="{1D8BD707-D9CF-40AE-B4C6-C98DA3205C09}" type="datetimeFigureOut">
               <a:rPr lang="en-US"/>
-              <a:t>7/14/2021</a:t>
+              <a:t>2/16/2022</a:t>
             </a:fld>
             <a:endParaRPr lang="en-US"/>
           </a:p>
@@ -1300,7 +1301,7 @@
           </a:lstStyle>
           <a:p>
             <a:fld id="{B6F15528-21DE-4FAA-801E-634DDDAF4B2B}" type="slidenum">
-              <a:t>‹#›</a:t>
+              <a:t>‹N°›</a:t>
             </a:fld>
             <a:endParaRPr/>
           </a:p>
@@ -1416,7 +1417,7 @@
           <a:p>
             <a:fld id="{1D8BD707-D9CF-40AE-B4C6-C98DA3205C09}" type="datetimeFigureOut">
               <a:rPr lang="en-US"/>
-              <a:t>7/14/2021</a:t>
+              <a:t>2/16/2022</a:t>
             </a:fld>
             <a:endParaRPr lang="en-US"/>
           </a:p>
@@ -1448,7 +1449,7 @@
           </a:lstStyle>
           <a:p>
             <a:fld id="{B6F15528-21DE-4FAA-801E-634DDDAF4B2B}" type="slidenum">
-              <a:t>‹#›</a:t>
+              <a:t>‹N°›</a:t>
             </a:fld>
             <a:endParaRPr/>
           </a:p>
@@ -1535,7 +1536,7 @@
           <a:p>
             <a:fld id="{1D8BD707-D9CF-40AE-B4C6-C98DA3205C09}" type="datetimeFigureOut">
               <a:rPr lang="en-US"/>
-              <a:t>7/14/2021</a:t>
+              <a:t>2/16/2022</a:t>
             </a:fld>
             <a:endParaRPr lang="en-US"/>
           </a:p>
@@ -1567,7 +1568,7 @@
           </a:lstStyle>
           <a:p>
             <a:fld id="{B6F15528-21DE-4FAA-801E-634DDDAF4B2B}" type="slidenum">
-              <a:t>‹#›</a:t>
+              <a:t>‹N°›</a:t>
             </a:fld>
             <a:endParaRPr/>
           </a:p>
@@ -1760,7 +1761,7 @@
           <a:p>
             <a:fld id="{1D8BD707-D9CF-40AE-B4C6-C98DA3205C09}" type="datetimeFigureOut">
               <a:rPr lang="en-US"/>
-              <a:t>7/14/2021</a:t>
+              <a:t>2/16/2022</a:t>
             </a:fld>
             <a:endParaRPr lang="en-US"/>
           </a:p>
@@ -1802,7 +1803,7 @@
           </a:lstStyle>
           <a:p>
             <a:fld id="{B6F15528-21DE-4FAA-801E-634DDDAF4B2B}" type="slidenum">
-              <a:t>‹#›</a:t>
+              <a:t>‹N°›</a:t>
             </a:fld>
             <a:endParaRPr/>
           </a:p>
@@ -2056,6 +2057,692 @@
 </file>
 
 <file path=ppt/slides/slide10.xml><?xml version="1.0" encoding="utf-8"?>
+<p:sld xmlns:a="http://schemas.openxmlformats.org/drawingml/2006/main" xmlns:r="http://schemas.openxmlformats.org/officeDocument/2006/relationships" xmlns:p="http://schemas.openxmlformats.org/presentationml/2006/main">
+  <p:cSld>
+    <p:spTree>
+      <p:nvGrpSpPr>
+        <p:cNvPr id="1" name=""/>
+        <p:cNvGrpSpPr/>
+        <p:nvPr/>
+      </p:nvGrpSpPr>
+      <p:grpSpPr>
+        <a:xfrm>
+          <a:off x="0" y="0"/>
+          <a:ext cx="0" cy="0"/>
+          <a:chOff x="0" y="0"/>
+          <a:chExt cx="0" cy="0"/>
+        </a:xfrm>
+      </p:grpSpPr>
+      <p:sp>
+        <p:nvSpPr>
+          <p:cNvPr id="2" name="object 2"/>
+          <p:cNvSpPr txBox="1"/>
+          <p:nvPr/>
+        </p:nvSpPr>
+        <p:spPr>
+          <a:xfrm>
+            <a:off x="692151" y="1622805"/>
+            <a:ext cx="9648824" cy="5130251"/>
+          </a:xfrm>
+          <a:prstGeom prst="rect">
+            <a:avLst/>
+          </a:prstGeom>
+        </p:spPr>
+        <p:txBody>
+          <a:bodyPr vert="horz" wrap="square" lIns="0" tIns="13335" rIns="0" bIns="0" rtlCol="0">
+            <a:spAutoFit/>
+          </a:bodyPr>
+          <a:lstStyle/>
+          <a:p>
+            <a:pPr marL="342900" indent="-342900">
+              <a:lnSpc>
+                <a:spcPct val="100000"/>
+              </a:lnSpc>
+              <a:spcBef>
+                <a:spcPts val="55"/>
+              </a:spcBef>
+              <a:buFont typeface="Arial" panose="020B0604020202020204" pitchFamily="34" charset="0"/>
+              <a:buChar char="•"/>
+            </a:pPr>
+            <a:r>
+              <a:rPr lang="fr-FR" sz="2000">
+                <a:latin typeface="Verdana"/>
+                <a:cs typeface="Verdana"/>
+              </a:rPr>
+              <a:t>Heavy computation</a:t>
+            </a:r>
+          </a:p>
+          <a:p>
+            <a:pPr lvl="1">
+              <a:spcBef>
+                <a:spcPts val="55"/>
+              </a:spcBef>
+            </a:pPr>
+            <a:r>
+              <a:rPr lang="fr-FR" sz="2000" err="1">
+                <a:solidFill>
+                  <a:srgbClr val="0070C0"/>
+                </a:solidFill>
+                <a:latin typeface="Verdana"/>
+                <a:cs typeface="Verdana"/>
+              </a:rPr>
+              <a:t>Parallelize</a:t>
+            </a:r>
+            <a:r>
+              <a:rPr lang="fr-FR" sz="2000">
+                <a:solidFill>
+                  <a:srgbClr val="0070C0"/>
+                </a:solidFill>
+                <a:latin typeface="Verdana"/>
+                <a:cs typeface="Verdana"/>
+              </a:rPr>
+              <a:t>, use </a:t>
+            </a:r>
+            <a:r>
+              <a:rPr lang="fr-FR" sz="2000" err="1">
+                <a:solidFill>
+                  <a:srgbClr val="0070C0"/>
+                </a:solidFill>
+                <a:latin typeface="Verdana"/>
+                <a:cs typeface="Verdana"/>
+              </a:rPr>
+              <a:t>specialised</a:t>
+            </a:r>
+            <a:r>
+              <a:rPr lang="fr-FR" sz="2000">
+                <a:solidFill>
+                  <a:srgbClr val="0070C0"/>
+                </a:solidFill>
+                <a:latin typeface="Verdana"/>
+                <a:cs typeface="Verdana"/>
+              </a:rPr>
+              <a:t> hardware</a:t>
+            </a:r>
+          </a:p>
+          <a:p>
+            <a:pPr marL="342900" indent="-342900">
+              <a:lnSpc>
+                <a:spcPct val="100000"/>
+              </a:lnSpc>
+              <a:spcBef>
+                <a:spcPts val="55"/>
+              </a:spcBef>
+              <a:buFont typeface="Arial" panose="020B0604020202020204" pitchFamily="34" charset="0"/>
+              <a:buChar char="•"/>
+            </a:pPr>
+            <a:endParaRPr lang="fr-FR" sz="2000">
+              <a:latin typeface="Verdana"/>
+              <a:cs typeface="Verdana"/>
+            </a:endParaRPr>
+          </a:p>
+          <a:p>
+            <a:pPr marL="342900" indent="-342900">
+              <a:lnSpc>
+                <a:spcPct val="100000"/>
+              </a:lnSpc>
+              <a:spcBef>
+                <a:spcPts val="55"/>
+              </a:spcBef>
+              <a:buFont typeface="Arial" panose="020B0604020202020204" pitchFamily="34" charset="0"/>
+              <a:buChar char="•"/>
+            </a:pPr>
+            <a:r>
+              <a:rPr lang="fr-FR" sz="2000" err="1">
+                <a:latin typeface="Verdana"/>
+                <a:cs typeface="Verdana"/>
+              </a:rPr>
+              <a:t>Dataset</a:t>
+            </a:r>
+            <a:r>
+              <a:rPr lang="fr-FR" sz="2000">
+                <a:latin typeface="Verdana"/>
+                <a:cs typeface="Verdana"/>
+              </a:rPr>
+              <a:t> </a:t>
+            </a:r>
+            <a:r>
+              <a:rPr lang="fr-FR" sz="2000" err="1">
+                <a:latin typeface="Verdana"/>
+                <a:cs typeface="Verdana"/>
+              </a:rPr>
+              <a:t>does</a:t>
+            </a:r>
+            <a:r>
+              <a:rPr lang="fr-FR" sz="2000">
+                <a:latin typeface="Verdana"/>
+                <a:cs typeface="Verdana"/>
+              </a:rPr>
+              <a:t> not fit in RAM</a:t>
+            </a:r>
+          </a:p>
+          <a:p>
+            <a:pPr lvl="1">
+              <a:spcBef>
+                <a:spcPts val="55"/>
+              </a:spcBef>
+            </a:pPr>
+            <a:r>
+              <a:rPr lang="fr-FR" sz="2000">
+                <a:solidFill>
+                  <a:srgbClr val="0070C0"/>
+                </a:solidFill>
+                <a:latin typeface="Verdana"/>
+                <a:cs typeface="Verdana"/>
+              </a:rPr>
+              <a:t>Streaming data</a:t>
+            </a:r>
+          </a:p>
+          <a:p>
+            <a:pPr lvl="1">
+              <a:spcBef>
+                <a:spcPts val="55"/>
+              </a:spcBef>
+            </a:pPr>
+            <a:endParaRPr lang="fr-FR" sz="2000">
+              <a:solidFill>
+                <a:srgbClr val="0070C0"/>
+              </a:solidFill>
+              <a:latin typeface="Verdana"/>
+              <a:cs typeface="Verdana"/>
+            </a:endParaRPr>
+          </a:p>
+          <a:p>
+            <a:pPr marL="342900" indent="-342900">
+              <a:lnSpc>
+                <a:spcPct val="100000"/>
+              </a:lnSpc>
+              <a:spcBef>
+                <a:spcPts val="55"/>
+              </a:spcBef>
+              <a:buFont typeface="Arial" panose="020B0604020202020204" pitchFamily="34" charset="0"/>
+              <a:buChar char="•"/>
+            </a:pPr>
+            <a:r>
+              <a:rPr lang="fr-FR" sz="2000">
+                <a:latin typeface="Verdana"/>
+                <a:cs typeface="Verdana"/>
+              </a:rPr>
+              <a:t>Polynomial </a:t>
+            </a:r>
+            <a:r>
+              <a:rPr lang="fr-FR" sz="2000" err="1">
+                <a:latin typeface="Verdana"/>
+                <a:cs typeface="Verdana"/>
+              </a:rPr>
+              <a:t>algorithms</a:t>
+            </a:r>
+            <a:r>
+              <a:rPr lang="fr-FR" sz="2000">
+                <a:latin typeface="Verdana"/>
+                <a:cs typeface="Verdana"/>
+              </a:rPr>
+              <a:t> are </a:t>
+            </a:r>
+            <a:r>
+              <a:rPr lang="fr-FR" sz="2000" err="1">
+                <a:latin typeface="Verdana"/>
+                <a:cs typeface="Verdana"/>
+              </a:rPr>
+              <a:t>too</a:t>
+            </a:r>
+            <a:r>
+              <a:rPr lang="fr-FR" sz="2000">
+                <a:latin typeface="Verdana"/>
+                <a:cs typeface="Verdana"/>
+              </a:rPr>
+              <a:t> </a:t>
+            </a:r>
+            <a:r>
+              <a:rPr lang="fr-FR" sz="2000" err="1">
+                <a:latin typeface="Verdana"/>
+                <a:cs typeface="Verdana"/>
+              </a:rPr>
+              <a:t>costly</a:t>
+            </a:r>
+            <a:r>
+              <a:rPr lang="fr-FR" sz="2000">
+                <a:latin typeface="Verdana"/>
+                <a:cs typeface="Verdana"/>
+              </a:rPr>
+              <a:t>: </a:t>
+            </a:r>
+          </a:p>
+          <a:p>
+            <a:pPr lvl="1">
+              <a:spcBef>
+                <a:spcPts val="55"/>
+              </a:spcBef>
+            </a:pPr>
+            <a:r>
+              <a:rPr lang="fr-FR" sz="2000" strike="sngStrike">
+                <a:latin typeface="Verdana"/>
+                <a:cs typeface="Verdana"/>
+              </a:rPr>
+              <a:t>O( n².d)</a:t>
+            </a:r>
+            <a:r>
+              <a:rPr lang="fr-FR" sz="2000">
+                <a:latin typeface="Verdana"/>
+                <a:cs typeface="Verdana"/>
+              </a:rPr>
+              <a:t>     </a:t>
+            </a:r>
+            <a:r>
+              <a:rPr lang="fr-FR" sz="2000" strike="sngStrike">
+                <a:latin typeface="Verdana"/>
+                <a:cs typeface="Verdana"/>
+              </a:rPr>
+              <a:t>O(n.d²)</a:t>
+            </a:r>
+          </a:p>
+          <a:p>
+            <a:pPr lvl="1">
+              <a:spcBef>
+                <a:spcPts val="55"/>
+              </a:spcBef>
+            </a:pPr>
+            <a:r>
+              <a:rPr lang="fr-FR" sz="2000">
+                <a:solidFill>
+                  <a:srgbClr val="0070C0"/>
+                </a:solidFill>
+                <a:latin typeface="Verdana"/>
+                <a:cs typeface="Verdana"/>
+              </a:rPr>
+              <a:t>Use </a:t>
+            </a:r>
+            <a:r>
+              <a:rPr lang="fr-FR" sz="2000" err="1">
+                <a:solidFill>
+                  <a:srgbClr val="0070C0"/>
+                </a:solidFill>
+                <a:latin typeface="Verdana"/>
+                <a:cs typeface="Verdana"/>
+              </a:rPr>
+              <a:t>linear</a:t>
+            </a:r>
+            <a:r>
+              <a:rPr lang="fr-FR" sz="2000">
+                <a:solidFill>
+                  <a:srgbClr val="0070C0"/>
+                </a:solidFill>
+                <a:latin typeface="Verdana"/>
+                <a:cs typeface="Verdana"/>
+              </a:rPr>
+              <a:t> </a:t>
+            </a:r>
+            <a:r>
+              <a:rPr lang="fr-FR" sz="2000" err="1">
+                <a:solidFill>
+                  <a:srgbClr val="0070C0"/>
+                </a:solidFill>
+                <a:latin typeface="Verdana"/>
+                <a:cs typeface="Verdana"/>
+              </a:rPr>
+              <a:t>algorithms</a:t>
+            </a:r>
+            <a:endParaRPr lang="fr-FR" sz="2000">
+              <a:solidFill>
+                <a:srgbClr val="0070C0"/>
+              </a:solidFill>
+              <a:latin typeface="Verdana"/>
+              <a:cs typeface="Verdana"/>
+            </a:endParaRPr>
+          </a:p>
+          <a:p>
+            <a:pPr>
+              <a:lnSpc>
+                <a:spcPct val="100000"/>
+              </a:lnSpc>
+              <a:spcBef>
+                <a:spcPts val="55"/>
+              </a:spcBef>
+            </a:pPr>
+            <a:endParaRPr lang="fr-FR" sz="2000">
+              <a:latin typeface="Verdana"/>
+              <a:cs typeface="Verdana"/>
+            </a:endParaRPr>
+          </a:p>
+          <a:p>
+            <a:pPr marL="342900" indent="-342900">
+              <a:lnSpc>
+                <a:spcPct val="100000"/>
+              </a:lnSpc>
+              <a:spcBef>
+                <a:spcPts val="55"/>
+              </a:spcBef>
+              <a:buFont typeface="Arial" panose="020B0604020202020204" pitchFamily="34" charset="0"/>
+              <a:buChar char="•"/>
+            </a:pPr>
+            <a:r>
+              <a:rPr lang="fr-FR" sz="2000" err="1">
+                <a:latin typeface="Verdana"/>
+                <a:cs typeface="Verdana"/>
+              </a:rPr>
+              <a:t>Collecting</a:t>
+            </a:r>
+            <a:r>
+              <a:rPr lang="fr-FR" sz="2000">
+                <a:latin typeface="Verdana"/>
+                <a:cs typeface="Verdana"/>
+              </a:rPr>
+              <a:t> </a:t>
+            </a:r>
+            <a:r>
+              <a:rPr lang="fr-FR" sz="2000" err="1">
+                <a:latin typeface="Verdana"/>
+                <a:cs typeface="Verdana"/>
+              </a:rPr>
+              <a:t>enough</a:t>
+            </a:r>
+            <a:r>
+              <a:rPr lang="fr-FR" sz="2000">
+                <a:latin typeface="Verdana"/>
+                <a:cs typeface="Verdana"/>
+              </a:rPr>
+              <a:t> </a:t>
+            </a:r>
+            <a:r>
+              <a:rPr lang="fr-FR" sz="2000" err="1">
+                <a:latin typeface="Verdana"/>
+                <a:cs typeface="Verdana"/>
+              </a:rPr>
+              <a:t>labeled</a:t>
+            </a:r>
+            <a:r>
+              <a:rPr lang="fr-FR" sz="2000">
+                <a:latin typeface="Verdana"/>
+                <a:cs typeface="Verdana"/>
+              </a:rPr>
+              <a:t> </a:t>
+            </a:r>
+            <a:r>
+              <a:rPr lang="fr-FR" sz="2000" err="1">
+                <a:latin typeface="Verdana"/>
+                <a:cs typeface="Verdana"/>
+              </a:rPr>
+              <a:t>samples</a:t>
+            </a:r>
+            <a:r>
+              <a:rPr lang="fr-FR" sz="2000">
+                <a:latin typeface="Verdana"/>
+                <a:cs typeface="Verdana"/>
+              </a:rPr>
+              <a:t>?</a:t>
+            </a:r>
+          </a:p>
+          <a:p>
+            <a:pPr lvl="1">
+              <a:spcBef>
+                <a:spcPts val="55"/>
+              </a:spcBef>
+            </a:pPr>
+            <a:r>
+              <a:rPr lang="fr-FR" sz="2000">
+                <a:solidFill>
+                  <a:srgbClr val="0070C0"/>
+                </a:solidFill>
+                <a:latin typeface="Verdana"/>
+                <a:cs typeface="Verdana"/>
+              </a:rPr>
+              <a:t>Transfer </a:t>
+            </a:r>
+            <a:r>
+              <a:rPr lang="fr-FR" sz="2000" err="1">
+                <a:solidFill>
+                  <a:srgbClr val="0070C0"/>
+                </a:solidFill>
+                <a:latin typeface="Verdana"/>
+                <a:cs typeface="Verdana"/>
+              </a:rPr>
+              <a:t>from</a:t>
+            </a:r>
+            <a:r>
+              <a:rPr lang="fr-FR" sz="2000">
+                <a:solidFill>
+                  <a:srgbClr val="0070C0"/>
+                </a:solidFill>
+                <a:latin typeface="Verdana"/>
+                <a:cs typeface="Verdana"/>
+              </a:rPr>
+              <a:t> </a:t>
+            </a:r>
+            <a:r>
+              <a:rPr lang="fr-FR" sz="2000" err="1">
+                <a:solidFill>
+                  <a:srgbClr val="0070C0"/>
+                </a:solidFill>
+                <a:latin typeface="Verdana"/>
+                <a:cs typeface="Verdana"/>
+              </a:rPr>
+              <a:t>similar</a:t>
+            </a:r>
+            <a:r>
+              <a:rPr lang="fr-FR" sz="2000">
+                <a:solidFill>
+                  <a:srgbClr val="0070C0"/>
+                </a:solidFill>
+                <a:latin typeface="Verdana"/>
+                <a:cs typeface="Verdana"/>
+              </a:rPr>
+              <a:t> </a:t>
+            </a:r>
+            <a:r>
+              <a:rPr lang="fr-FR" sz="2000" err="1">
+                <a:solidFill>
+                  <a:srgbClr val="0070C0"/>
+                </a:solidFill>
+                <a:latin typeface="Verdana"/>
+                <a:cs typeface="Verdana"/>
+              </a:rPr>
+              <a:t>tasks</a:t>
+            </a:r>
+            <a:endParaRPr lang="fr-FR" sz="2000">
+              <a:solidFill>
+                <a:srgbClr val="0070C0"/>
+              </a:solidFill>
+              <a:latin typeface="Verdana"/>
+              <a:cs typeface="Verdana"/>
+            </a:endParaRPr>
+          </a:p>
+          <a:p>
+            <a:pPr lvl="1">
+              <a:spcBef>
+                <a:spcPts val="55"/>
+              </a:spcBef>
+            </a:pPr>
+            <a:endParaRPr lang="fr-FR" sz="2000">
+              <a:solidFill>
+                <a:srgbClr val="0070C0"/>
+              </a:solidFill>
+              <a:latin typeface="Verdana"/>
+              <a:cs typeface="Verdana"/>
+            </a:endParaRPr>
+          </a:p>
+          <a:p>
+            <a:pPr marL="342900" indent="-342900">
+              <a:lnSpc>
+                <a:spcPct val="100000"/>
+              </a:lnSpc>
+              <a:spcBef>
+                <a:spcPts val="55"/>
+              </a:spcBef>
+              <a:buFont typeface="Arial" panose="020B0604020202020204" pitchFamily="34" charset="0"/>
+              <a:buChar char="•"/>
+            </a:pPr>
+            <a:r>
+              <a:rPr lang="fr-FR" sz="2000">
+                <a:latin typeface="Verdana"/>
+                <a:cs typeface="Verdana"/>
+              </a:rPr>
+              <a:t>Model performances </a:t>
+            </a:r>
+            <a:r>
+              <a:rPr lang="fr-FR" sz="2000" err="1">
+                <a:latin typeface="Verdana"/>
+                <a:cs typeface="Verdana"/>
+              </a:rPr>
+              <a:t>limited</a:t>
+            </a:r>
+            <a:r>
+              <a:rPr lang="fr-FR" sz="2000">
+                <a:latin typeface="Verdana"/>
+                <a:cs typeface="Verdana"/>
+              </a:rPr>
+              <a:t> </a:t>
+            </a:r>
+            <a:r>
+              <a:rPr lang="fr-FR" sz="2000" strike="sngStrike">
+                <a:latin typeface="Verdana"/>
+                <a:cs typeface="Verdana"/>
+              </a:rPr>
+              <a:t>by </a:t>
+            </a:r>
+            <a:r>
+              <a:rPr lang="fr-FR" sz="2000" strike="sngStrike" err="1">
+                <a:latin typeface="Verdana"/>
+                <a:cs typeface="Verdana"/>
+              </a:rPr>
+              <a:t>Number</a:t>
+            </a:r>
+            <a:r>
+              <a:rPr lang="fr-FR" sz="2000" strike="sngStrike">
+                <a:latin typeface="Verdana"/>
+                <a:cs typeface="Verdana"/>
+              </a:rPr>
+              <a:t> </a:t>
+            </a:r>
+            <a:r>
+              <a:rPr lang="fr-FR" sz="2000" strike="sngStrike" err="1">
+                <a:latin typeface="Verdana"/>
+                <a:cs typeface="Verdana"/>
+              </a:rPr>
+              <a:t>samples</a:t>
+            </a:r>
+            <a:endParaRPr lang="fr-FR" sz="2000" strike="sngStrike">
+              <a:latin typeface="Verdana"/>
+              <a:cs typeface="Verdana"/>
+            </a:endParaRPr>
+          </a:p>
+          <a:p>
+            <a:pPr lvl="1">
+              <a:spcBef>
+                <a:spcPts val="55"/>
+              </a:spcBef>
+            </a:pPr>
+            <a:r>
+              <a:rPr lang="fr-FR" sz="2000">
+                <a:solidFill>
+                  <a:srgbClr val="0070C0"/>
+                </a:solidFill>
+                <a:latin typeface="Verdana"/>
+                <a:cs typeface="Verdana"/>
+              </a:rPr>
+              <a:t>Limited by training </a:t>
+            </a:r>
+            <a:r>
+              <a:rPr lang="fr-FR" sz="2000" err="1">
+                <a:solidFill>
+                  <a:srgbClr val="0070C0"/>
+                </a:solidFill>
+                <a:latin typeface="Verdana"/>
+                <a:cs typeface="Verdana"/>
+              </a:rPr>
+              <a:t>cost</a:t>
+            </a:r>
+            <a:endParaRPr lang="fr-FR" sz="2000">
+              <a:solidFill>
+                <a:srgbClr val="0070C0"/>
+              </a:solidFill>
+              <a:latin typeface="Verdana"/>
+              <a:cs typeface="Verdana"/>
+            </a:endParaRPr>
+          </a:p>
+          <a:p>
+            <a:pPr lvl="1">
+              <a:spcBef>
+                <a:spcPts val="55"/>
+              </a:spcBef>
+            </a:pPr>
+            <a:endParaRPr lang="fr-FR" sz="2000">
+              <a:solidFill>
+                <a:srgbClr val="0070C0"/>
+              </a:solidFill>
+              <a:latin typeface="Verdana"/>
+              <a:cs typeface="Verdana"/>
+            </a:endParaRPr>
+          </a:p>
+        </p:txBody>
+      </p:sp>
+      <p:sp>
+        <p:nvSpPr>
+          <p:cNvPr id="3" name="Title 1">
+            <a:extLst>
+              <a:ext uri="{FF2B5EF4-FFF2-40B4-BE49-F238E27FC236}">
+                <a16:creationId xmlns:a16="http://schemas.microsoft.com/office/drawing/2014/main" id="{875725B8-E8DC-4204-81A5-7DCC3E98267B}"/>
+              </a:ext>
+            </a:extLst>
+          </p:cNvPr>
+          <p:cNvSpPr txBox="1">
+            <a:spLocks/>
+          </p:cNvSpPr>
+          <p:nvPr/>
+        </p:nvSpPr>
+        <p:spPr>
+          <a:xfrm>
+            <a:off x="839073" y="368284"/>
+            <a:ext cx="10526554" cy="1326944"/>
+          </a:xfrm>
+          <a:prstGeom prst="rect">
+            <a:avLst/>
+          </a:prstGeom>
+        </p:spPr>
+        <p:txBody>
+          <a:bodyPr/>
+          <a:lstStyle>
+            <a:lvl1pPr algn="l" defTabSz="914400" rtl="0" eaLnBrk="1" latinLnBrk="0" hangingPunct="1">
+              <a:lnSpc>
+                <a:spcPct val="90000"/>
+              </a:lnSpc>
+              <a:spcBef>
+                <a:spcPct val="0"/>
+              </a:spcBef>
+              <a:buNone/>
+              <a:defRPr sz="4400" kern="1200">
+                <a:solidFill>
+                  <a:schemeClr val="tx1"/>
+                </a:solidFill>
+                <a:latin typeface="+mj-lt"/>
+                <a:ea typeface="+mj-ea"/>
+                <a:cs typeface="+mj-cs"/>
+              </a:defRPr>
+            </a:lvl1pPr>
+          </a:lstStyle>
+          <a:p>
+            <a:r>
+              <a:rPr lang="en-US" sz="3600">
+                <a:latin typeface="Verdana" panose="020B0604030504040204" pitchFamily="34" charset="0"/>
+                <a:ea typeface="Verdana" panose="020B0604030504040204" pitchFamily="34" charset="0"/>
+              </a:rPr>
+              <a:t>Large scale ML</a:t>
+            </a:r>
+          </a:p>
+        </p:txBody>
+      </p:sp>
+    </p:spTree>
+    <p:extLst>
+      <p:ext uri="{BB962C8B-B14F-4D97-AF65-F5344CB8AC3E}">
+        <p14:creationId xmlns:p14="http://schemas.microsoft.com/office/powerpoint/2010/main" val="1934310155"/>
+      </p:ext>
+    </p:extLst>
+  </p:cSld>
+  <p:clrMapOvr>
+    <a:masterClrMapping/>
+  </p:clrMapOvr>
+</p:sld>
+</file>
+
+<file path=ppt/slides/slide11.xml><?xml version="1.0" encoding="utf-8"?>
 <p:sld xmlns:a="http://schemas.openxmlformats.org/drawingml/2006/main" xmlns:r="http://schemas.openxmlformats.org/officeDocument/2006/relationships" xmlns:p="http://schemas.openxmlformats.org/presentationml/2006/main" showMasterSp="0">
   <p:cSld>
     <p:spTree>
@@ -3274,7 +3961,7 @@
 </p:sld>
 </file>
 
-<file path=ppt/slides/slide11.xml><?xml version="1.0" encoding="utf-8"?>
+<file path=ppt/slides/slide12.xml><?xml version="1.0" encoding="utf-8"?>
 <p:sld xmlns:a="http://schemas.openxmlformats.org/drawingml/2006/main" xmlns:r="http://schemas.openxmlformats.org/officeDocument/2006/relationships" xmlns:p="http://schemas.openxmlformats.org/presentationml/2006/main">
   <p:cSld>
     <p:spTree>
@@ -4042,7 +4729,7 @@
 </p:sld>
 </file>
 
-<file path=ppt/slides/slide12.xml><?xml version="1.0" encoding="utf-8"?>
+<file path=ppt/slides/slide13.xml><?xml version="1.0" encoding="utf-8"?>
 <p:sld xmlns:a="http://schemas.openxmlformats.org/drawingml/2006/main" xmlns:r="http://schemas.openxmlformats.org/officeDocument/2006/relationships" xmlns:p="http://schemas.openxmlformats.org/presentationml/2006/main" showMasterSp="0">
   <p:cSld>
     <p:spTree>
@@ -4449,7 +5136,7 @@
 </p:sld>
 </file>
 
-<file path=ppt/slides/slide13.xml><?xml version="1.0" encoding="utf-8"?>
+<file path=ppt/slides/slide14.xml><?xml version="1.0" encoding="utf-8"?>
 <p:sld xmlns:a="http://schemas.openxmlformats.org/drawingml/2006/main" xmlns:r="http://schemas.openxmlformats.org/officeDocument/2006/relationships" xmlns:p="http://schemas.openxmlformats.org/presentationml/2006/main">
   <p:cSld>
     <p:spTree>
@@ -5248,7 +5935,7 @@
 </p:sld>
 </file>
 
-<file path=ppt/slides/slide14.xml><?xml version="1.0" encoding="utf-8"?>
+<file path=ppt/slides/slide15.xml><?xml version="1.0" encoding="utf-8"?>
 <p:sld xmlns:a="http://schemas.openxmlformats.org/drawingml/2006/main" xmlns:r="http://schemas.openxmlformats.org/officeDocument/2006/relationships" xmlns:p="http://schemas.openxmlformats.org/presentationml/2006/main">
   <p:cSld>
     <p:spTree>
@@ -6909,7 +7596,7 @@
 </p:sld>
 </file>
 
-<file path=ppt/slides/slide15.xml><?xml version="1.0" encoding="utf-8"?>
+<file path=ppt/slides/slide16.xml><?xml version="1.0" encoding="utf-8"?>
 <p:sld xmlns:a="http://schemas.openxmlformats.org/drawingml/2006/main" xmlns:r="http://schemas.openxmlformats.org/officeDocument/2006/relationships" xmlns:p="http://schemas.openxmlformats.org/presentationml/2006/main">
   <p:cSld>
     <p:spTree>
@@ -8121,7 +8808,7 @@
 </p:sld>
 </file>
 
-<file path=ppt/slides/slide16.xml><?xml version="1.0" encoding="utf-8"?>
+<file path=ppt/slides/slide17.xml><?xml version="1.0" encoding="utf-8"?>
 <p:sld xmlns:a="http://schemas.openxmlformats.org/drawingml/2006/main" xmlns:r="http://schemas.openxmlformats.org/officeDocument/2006/relationships" xmlns:p="http://schemas.openxmlformats.org/presentationml/2006/main">
   <p:cSld>
     <p:spTree>
@@ -9419,7 +10106,7 @@
 </p:sld>
 </file>
 
-<file path=ppt/slides/slide17.xml><?xml version="1.0" encoding="utf-8"?>
+<file path=ppt/slides/slide18.xml><?xml version="1.0" encoding="utf-8"?>
 <p:sld xmlns:a="http://schemas.openxmlformats.org/drawingml/2006/main" xmlns:r="http://schemas.openxmlformats.org/officeDocument/2006/relationships" xmlns:p="http://schemas.openxmlformats.org/presentationml/2006/main">
   <p:cSld>
     <p:spTree>
@@ -10125,7 +10812,7 @@
 </p:sld>
 </file>
 
-<file path=ppt/slides/slide18.xml><?xml version="1.0" encoding="utf-8"?>
+<file path=ppt/slides/slide19.xml><?xml version="1.0" encoding="utf-8"?>
 <p:sld xmlns:a="http://schemas.openxmlformats.org/drawingml/2006/main" xmlns:r="http://schemas.openxmlformats.org/officeDocument/2006/relationships" xmlns:p="http://schemas.openxmlformats.org/presentationml/2006/main">
   <p:cSld>
     <p:spTree>
@@ -10602,838 +11289,6 @@
 </p:sld>
 </file>
 
-<file path=ppt/slides/slide19.xml><?xml version="1.0" encoding="utf-8"?>
-<p:sld xmlns:a="http://schemas.openxmlformats.org/drawingml/2006/main" xmlns:r="http://schemas.openxmlformats.org/officeDocument/2006/relationships" xmlns:p="http://schemas.openxmlformats.org/presentationml/2006/main">
-  <p:cSld>
-    <p:spTree>
-      <p:nvGrpSpPr>
-        <p:cNvPr id="1" name=""/>
-        <p:cNvGrpSpPr/>
-        <p:nvPr/>
-      </p:nvGrpSpPr>
-      <p:grpSpPr>
-        <a:xfrm>
-          <a:off x="0" y="0"/>
-          <a:ext cx="0" cy="0"/>
-          <a:chOff x="0" y="0"/>
-          <a:chExt cx="0" cy="0"/>
-        </a:xfrm>
-      </p:grpSpPr>
-      <p:sp>
-        <p:nvSpPr>
-          <p:cNvPr id="3" name="object 3"/>
-          <p:cNvSpPr txBox="1"/>
-          <p:nvPr/>
-        </p:nvSpPr>
-        <p:spPr>
-          <a:xfrm>
-            <a:off x="920750" y="1530350"/>
-            <a:ext cx="10668000" cy="723171"/>
-          </a:xfrm>
-          <a:prstGeom prst="rect">
-            <a:avLst/>
-          </a:prstGeom>
-        </p:spPr>
-        <p:txBody>
-          <a:bodyPr vert="horz" wrap="square" lIns="0" tIns="12724" rIns="0" bIns="0" rtlCol="0">
-            <a:spAutoFit/>
-          </a:bodyPr>
-          <a:lstStyle/>
-          <a:p>
-            <a:pPr marL="12088">
-              <a:lnSpc>
-                <a:spcPts val="2400"/>
-              </a:lnSpc>
-              <a:spcBef>
-                <a:spcPts val="566"/>
-              </a:spcBef>
-              <a:tabLst>
-                <a:tab pos="185772" algn="l"/>
-              </a:tabLst>
-            </a:pPr>
-            <a:r>
-              <a:rPr lang="fr-FR" sz="2800" spc="-35" err="1">
-                <a:solidFill>
-                  <a:srgbClr val="002060"/>
-                </a:solidFill>
-                <a:latin typeface="Calibri"/>
-                <a:cs typeface="Calibri"/>
-              </a:rPr>
-              <a:t>Constrained</a:t>
-            </a:r>
-            <a:r>
-              <a:rPr lang="fr-FR" sz="2800" spc="-35">
-                <a:solidFill>
-                  <a:srgbClr val="002060"/>
-                </a:solidFill>
-                <a:latin typeface="Calibri"/>
-                <a:cs typeface="Calibri"/>
-              </a:rPr>
-              <a:t> by the training time / training ressources</a:t>
-            </a:r>
-          </a:p>
-          <a:p>
-            <a:pPr marL="12088">
-              <a:lnSpc>
-                <a:spcPts val="2400"/>
-              </a:lnSpc>
-              <a:spcBef>
-                <a:spcPts val="566"/>
-              </a:spcBef>
-              <a:tabLst>
-                <a:tab pos="185772" algn="l"/>
-              </a:tabLst>
-            </a:pPr>
-            <a:endParaRPr lang="fr-FR" sz="2800" spc="-35">
-              <a:solidFill>
-                <a:srgbClr val="002060"/>
-              </a:solidFill>
-              <a:latin typeface="Calibri"/>
-              <a:cs typeface="Calibri"/>
-            </a:endParaRPr>
-          </a:p>
-        </p:txBody>
-      </p:sp>
-      <p:sp>
-        <p:nvSpPr>
-          <p:cNvPr id="5" name="Title 1">
-            <a:extLst>
-              <a:ext uri="{FF2B5EF4-FFF2-40B4-BE49-F238E27FC236}">
-                <a16:creationId xmlns:a16="http://schemas.microsoft.com/office/drawing/2014/main" id="{19E3936B-825F-423D-804B-7EA0C48604CA}"/>
-              </a:ext>
-            </a:extLst>
-          </p:cNvPr>
-          <p:cNvSpPr txBox="1">
-            <a:spLocks/>
-          </p:cNvSpPr>
-          <p:nvPr/>
-        </p:nvSpPr>
-        <p:spPr>
-          <a:xfrm>
-            <a:off x="539750" y="500222"/>
-            <a:ext cx="10526554" cy="1326944"/>
-          </a:xfrm>
-          <a:prstGeom prst="rect">
-            <a:avLst/>
-          </a:prstGeom>
-        </p:spPr>
-        <p:txBody>
-          <a:bodyPr/>
-          <a:lstStyle>
-            <a:lvl1pPr algn="l" defTabSz="914400" rtl="0" eaLnBrk="1" latinLnBrk="0" hangingPunct="1">
-              <a:lnSpc>
-                <a:spcPct val="90000"/>
-              </a:lnSpc>
-              <a:spcBef>
-                <a:spcPct val="0"/>
-              </a:spcBef>
-              <a:buNone/>
-              <a:defRPr sz="4400" kern="1200">
-                <a:solidFill>
-                  <a:schemeClr val="tx1"/>
-                </a:solidFill>
-                <a:latin typeface="+mj-lt"/>
-                <a:ea typeface="+mj-ea"/>
-                <a:cs typeface="+mj-cs"/>
-              </a:defRPr>
-            </a:lvl1pPr>
-          </a:lstStyle>
-          <a:p>
-            <a:r>
-              <a:rPr lang="en-US" sz="3600">
-                <a:latin typeface="Verdana" panose="020B0604030504040204" pitchFamily="34" charset="0"/>
-                <a:ea typeface="Verdana" panose="020B0604030504040204" pitchFamily="34" charset="0"/>
-              </a:rPr>
-              <a:t>Large scale learning</a:t>
-            </a:r>
-          </a:p>
-          <a:p>
-            <a:endParaRPr lang="en-US" sz="3600">
-              <a:latin typeface="Verdana" panose="020B0604030504040204" pitchFamily="34" charset="0"/>
-              <a:ea typeface="Verdana" panose="020B0604030504040204" pitchFamily="34" charset="0"/>
-            </a:endParaRPr>
-          </a:p>
-        </p:txBody>
-      </p:sp>
-      <p:sp>
-        <p:nvSpPr>
-          <p:cNvPr id="7" name="object 3">
-            <a:extLst>
-              <a:ext uri="{FF2B5EF4-FFF2-40B4-BE49-F238E27FC236}">
-                <a16:creationId xmlns:a16="http://schemas.microsoft.com/office/drawing/2014/main" id="{CEB5BEE3-E287-4437-AC8E-C5B30176FA46}"/>
-              </a:ext>
-            </a:extLst>
-          </p:cNvPr>
-          <p:cNvSpPr txBox="1"/>
-          <p:nvPr/>
-        </p:nvSpPr>
-        <p:spPr>
-          <a:xfrm>
-            <a:off x="1922304" y="2267491"/>
-            <a:ext cx="9144000" cy="2262054"/>
-          </a:xfrm>
-          <a:prstGeom prst="rect">
-            <a:avLst/>
-          </a:prstGeom>
-        </p:spPr>
-        <p:txBody>
-          <a:bodyPr vert="horz" wrap="square" lIns="0" tIns="12724" rIns="0" bIns="0" rtlCol="0">
-            <a:spAutoFit/>
-          </a:bodyPr>
-          <a:lstStyle/>
-          <a:p>
-            <a:pPr marL="12088">
-              <a:lnSpc>
-                <a:spcPts val="2400"/>
-              </a:lnSpc>
-              <a:spcBef>
-                <a:spcPts val="566"/>
-              </a:spcBef>
-              <a:tabLst>
-                <a:tab pos="185772" algn="l"/>
-              </a:tabLst>
-            </a:pPr>
-            <a:r>
-              <a:rPr lang="fr-FR" sz="2800" spc="-35">
-                <a:latin typeface="Calibri"/>
-                <a:cs typeface="Calibri"/>
-              </a:rPr>
-              <a:t>Example:  </a:t>
-            </a:r>
-            <a:r>
-              <a:rPr lang="fr-FR" sz="2800" spc="-35" err="1">
-                <a:latin typeface="Calibri"/>
-                <a:cs typeface="Calibri"/>
-              </a:rPr>
-              <a:t>OpenAI</a:t>
-            </a:r>
-            <a:r>
-              <a:rPr lang="fr-FR" sz="2800" spc="-35">
-                <a:latin typeface="Calibri"/>
-                <a:cs typeface="Calibri"/>
-              </a:rPr>
-              <a:t> GPT-3 </a:t>
-            </a:r>
-            <a:r>
-              <a:rPr lang="fr-FR" sz="2800" spc="-35" err="1">
-                <a:latin typeface="Calibri"/>
-                <a:cs typeface="Calibri"/>
-              </a:rPr>
-              <a:t>text</a:t>
-            </a:r>
-            <a:r>
-              <a:rPr lang="fr-FR" sz="2800" spc="-35">
-                <a:latin typeface="Calibri"/>
-                <a:cs typeface="Calibri"/>
-              </a:rPr>
-              <a:t> model</a:t>
-            </a:r>
-          </a:p>
-          <a:p>
-            <a:pPr marL="12088">
-              <a:lnSpc>
-                <a:spcPts val="2400"/>
-              </a:lnSpc>
-              <a:spcBef>
-                <a:spcPts val="566"/>
-              </a:spcBef>
-              <a:tabLst>
-                <a:tab pos="185772" algn="l"/>
-              </a:tabLst>
-            </a:pPr>
-            <a:endParaRPr lang="fr-FR" sz="2800" spc="-35">
-              <a:latin typeface="Calibri"/>
-              <a:cs typeface="Calibri"/>
-            </a:endParaRPr>
-          </a:p>
-          <a:p>
-            <a:pPr marL="469288" indent="-457200">
-              <a:lnSpc>
-                <a:spcPts val="2400"/>
-              </a:lnSpc>
-              <a:spcBef>
-                <a:spcPts val="566"/>
-              </a:spcBef>
-              <a:buFont typeface="Arial" panose="020B0604020202020204" pitchFamily="34" charset="0"/>
-              <a:buChar char="•"/>
-              <a:tabLst>
-                <a:tab pos="185772" algn="l"/>
-              </a:tabLst>
-            </a:pPr>
-            <a:r>
-              <a:rPr lang="en-US" sz="2800"/>
-              <a:t>Training set: 45 TB text data, mostly crawled from internet.</a:t>
-            </a:r>
-            <a:endParaRPr lang="fr-FR" sz="2800" spc="-35">
-              <a:latin typeface="Calibri"/>
-              <a:cs typeface="Calibri"/>
-            </a:endParaRPr>
-          </a:p>
-          <a:p>
-            <a:pPr marL="469288" indent="-457200">
-              <a:lnSpc>
-                <a:spcPts val="2400"/>
-              </a:lnSpc>
-              <a:spcBef>
-                <a:spcPts val="566"/>
-              </a:spcBef>
-              <a:buFont typeface="Arial" panose="020B0604020202020204" pitchFamily="34" charset="0"/>
-              <a:buChar char="•"/>
-              <a:tabLst>
-                <a:tab pos="185772" algn="l"/>
-              </a:tabLst>
-            </a:pPr>
-            <a:r>
-              <a:rPr lang="fr-FR" sz="2800"/>
-              <a:t>Training </a:t>
-            </a:r>
-            <a:r>
-              <a:rPr lang="fr-FR" sz="2800" err="1"/>
-              <a:t>cost</a:t>
-            </a:r>
-            <a:r>
-              <a:rPr lang="fr-FR" sz="2800"/>
-              <a:t> </a:t>
-            </a:r>
-            <a:r>
-              <a:rPr lang="fr-FR" sz="2800" err="1"/>
-              <a:t>estimated</a:t>
-            </a:r>
-            <a:r>
-              <a:rPr lang="fr-FR" sz="2800"/>
-              <a:t> to </a:t>
-            </a:r>
-            <a:r>
-              <a:rPr lang="fr-FR" sz="2800" err="1"/>
-              <a:t>several</a:t>
-            </a:r>
-            <a:r>
-              <a:rPr lang="fr-FR" sz="2800"/>
-              <a:t> M</a:t>
-            </a:r>
-            <a:r>
-              <a:rPr lang="en-US" sz="2800"/>
-              <a:t>€</a:t>
-            </a:r>
-          </a:p>
-          <a:p>
-            <a:pPr marL="469288" indent="-457200">
-              <a:lnSpc>
-                <a:spcPts val="2400"/>
-              </a:lnSpc>
-              <a:spcBef>
-                <a:spcPts val="566"/>
-              </a:spcBef>
-              <a:buFont typeface="Arial" panose="020B0604020202020204" pitchFamily="34" charset="0"/>
-              <a:buChar char="•"/>
-              <a:tabLst>
-                <a:tab pos="185772" algn="l"/>
-              </a:tabLst>
-            </a:pPr>
-            <a:endParaRPr lang="fr-FR" sz="2800" spc="-35">
-              <a:latin typeface="Calibri"/>
-              <a:cs typeface="Calibri"/>
-            </a:endParaRPr>
-          </a:p>
-          <a:p>
-            <a:pPr marL="12088">
-              <a:lnSpc>
-                <a:spcPts val="2400"/>
-              </a:lnSpc>
-              <a:spcBef>
-                <a:spcPts val="566"/>
-              </a:spcBef>
-              <a:tabLst>
-                <a:tab pos="185772" algn="l"/>
-              </a:tabLst>
-            </a:pPr>
-            <a:r>
-              <a:rPr lang="fr-FR" sz="2800" spc="-35">
-                <a:latin typeface="Calibri"/>
-                <a:cs typeface="Calibri"/>
-              </a:rPr>
-              <a:t>  </a:t>
-            </a:r>
-          </a:p>
-        </p:txBody>
-      </p:sp>
-      <p:sp>
-        <p:nvSpPr>
-          <p:cNvPr id="8" name="object 3">
-            <a:extLst>
-              <a:ext uri="{FF2B5EF4-FFF2-40B4-BE49-F238E27FC236}">
-                <a16:creationId xmlns:a16="http://schemas.microsoft.com/office/drawing/2014/main" id="{E6F57EEC-0F5B-41C7-A0E0-0F4DB5D00744}"/>
-              </a:ext>
-            </a:extLst>
-          </p:cNvPr>
-          <p:cNvSpPr txBox="1"/>
-          <p:nvPr/>
-        </p:nvSpPr>
-        <p:spPr>
-          <a:xfrm>
-            <a:off x="561340" y="4273550"/>
-            <a:ext cx="11201400" cy="3262328"/>
-          </a:xfrm>
-          <a:prstGeom prst="rect">
-            <a:avLst/>
-          </a:prstGeom>
-        </p:spPr>
-        <p:txBody>
-          <a:bodyPr vert="horz" wrap="square" lIns="0" tIns="12724" rIns="0" bIns="0" rtlCol="0">
-            <a:spAutoFit/>
-          </a:bodyPr>
-          <a:lstStyle/>
-          <a:p>
-            <a:pPr marL="12088">
-              <a:lnSpc>
-                <a:spcPts val="2400"/>
-              </a:lnSpc>
-              <a:spcBef>
-                <a:spcPts val="566"/>
-              </a:spcBef>
-              <a:tabLst>
-                <a:tab pos="185772" algn="l"/>
-              </a:tabLst>
-            </a:pPr>
-            <a:r>
-              <a:rPr lang="fr-FR" sz="2800" spc="-35" err="1">
-                <a:latin typeface="Calibri"/>
-                <a:cs typeface="Calibri"/>
-              </a:rPr>
-              <a:t>Computing</a:t>
-            </a:r>
-            <a:r>
-              <a:rPr lang="fr-FR" sz="2800" spc="-35">
-                <a:latin typeface="Calibri"/>
-                <a:cs typeface="Calibri"/>
-              </a:rPr>
-              <a:t> time </a:t>
-            </a:r>
-            <a:r>
-              <a:rPr lang="fr-FR" sz="2800" spc="-35" err="1">
-                <a:latin typeface="Calibri"/>
-                <a:cs typeface="Calibri"/>
-              </a:rPr>
-              <a:t>depends</a:t>
-            </a:r>
-            <a:r>
-              <a:rPr lang="fr-FR" sz="2800" spc="-35">
-                <a:latin typeface="Calibri"/>
-                <a:cs typeface="Calibri"/>
-              </a:rPr>
-              <a:t> on n, </a:t>
-            </a:r>
-            <a:r>
-              <a:rPr lang="en-US" sz="2800"/>
-              <a:t>ℱ</a:t>
-            </a:r>
-            <a:r>
-              <a:rPr lang="fr-FR" sz="2800" spc="-35">
-                <a:latin typeface="Calibri"/>
-                <a:cs typeface="Calibri"/>
-              </a:rPr>
-              <a:t> and </a:t>
-            </a:r>
-            <a:r>
-              <a:rPr lang="el-GR" sz="2800"/>
-              <a:t>ρ</a:t>
-            </a:r>
-            <a:r>
-              <a:rPr lang="fr-FR" sz="2800"/>
-              <a:t>. </a:t>
-            </a:r>
-          </a:p>
-          <a:p>
-            <a:pPr marL="12088">
-              <a:lnSpc>
-                <a:spcPts val="2400"/>
-              </a:lnSpc>
-              <a:spcBef>
-                <a:spcPts val="566"/>
-              </a:spcBef>
-              <a:tabLst>
-                <a:tab pos="185772" algn="l"/>
-              </a:tabLst>
-            </a:pPr>
-            <a:endParaRPr lang="fr-FR" sz="2800"/>
-          </a:p>
-          <a:p>
-            <a:pPr marL="469288" indent="-457200">
-              <a:lnSpc>
-                <a:spcPts val="2400"/>
-              </a:lnSpc>
-              <a:spcBef>
-                <a:spcPts val="566"/>
-              </a:spcBef>
-              <a:buFont typeface="Arial" panose="020B0604020202020204" pitchFamily="34" charset="0"/>
-              <a:buChar char="•"/>
-              <a:tabLst>
-                <a:tab pos="185772" algn="l"/>
-              </a:tabLst>
-            </a:pPr>
-            <a:r>
-              <a:rPr lang="fr-FR" sz="2800" spc="-35" err="1">
-                <a:latin typeface="Calibri"/>
-                <a:cs typeface="Calibri"/>
-              </a:rPr>
-              <a:t>Should</a:t>
-            </a:r>
-            <a:r>
-              <a:rPr lang="fr-FR" sz="2800" spc="-35">
-                <a:latin typeface="Calibri"/>
-                <a:cs typeface="Calibri"/>
-              </a:rPr>
-              <a:t> </a:t>
-            </a:r>
-            <a:r>
-              <a:rPr lang="fr-FR" sz="2800" spc="-35" err="1">
-                <a:latin typeface="Calibri"/>
-                <a:cs typeface="Calibri"/>
-              </a:rPr>
-              <a:t>you</a:t>
-            </a:r>
-            <a:r>
-              <a:rPr lang="fr-FR" sz="2800" spc="-35">
-                <a:latin typeface="Calibri"/>
-                <a:cs typeface="Calibri"/>
-              </a:rPr>
-              <a:t> use more </a:t>
-            </a:r>
-            <a:r>
-              <a:rPr lang="fr-FR" sz="2800" spc="-35" err="1">
-                <a:latin typeface="Calibri"/>
-                <a:cs typeface="Calibri"/>
-              </a:rPr>
-              <a:t>samples</a:t>
-            </a:r>
-            <a:r>
-              <a:rPr lang="fr-FR" sz="2800" spc="-35">
-                <a:latin typeface="Calibri"/>
-                <a:cs typeface="Calibri"/>
-              </a:rPr>
-              <a:t> or </a:t>
-            </a:r>
-            <a:r>
-              <a:rPr lang="fr-FR" sz="2800" spc="-35" err="1">
-                <a:latin typeface="Calibri"/>
-                <a:cs typeface="Calibri"/>
-              </a:rPr>
-              <a:t>spend</a:t>
-            </a:r>
-            <a:r>
-              <a:rPr lang="fr-FR" sz="2800" spc="-35">
-                <a:latin typeface="Calibri"/>
-                <a:cs typeface="Calibri"/>
-              </a:rPr>
-              <a:t> more time </a:t>
-            </a:r>
-            <a:r>
-              <a:rPr lang="fr-FR" sz="2800" spc="-35" err="1">
-                <a:latin typeface="Calibri"/>
-                <a:cs typeface="Calibri"/>
-              </a:rPr>
-              <a:t>optimizing</a:t>
-            </a:r>
-            <a:r>
-              <a:rPr lang="fr-FR" sz="2800" spc="-35">
-                <a:latin typeface="Calibri"/>
-                <a:cs typeface="Calibri"/>
-              </a:rPr>
-              <a:t> on </a:t>
-            </a:r>
-            <a:r>
-              <a:rPr lang="fr-FR" sz="2800" spc="-35" err="1">
-                <a:latin typeface="Calibri"/>
-                <a:cs typeface="Calibri"/>
-              </a:rPr>
-              <a:t>smaller</a:t>
-            </a:r>
-            <a:r>
-              <a:rPr lang="fr-FR" sz="2800" spc="-35">
-                <a:latin typeface="Calibri"/>
-                <a:cs typeface="Calibri"/>
-              </a:rPr>
-              <a:t> </a:t>
-            </a:r>
-            <a:r>
-              <a:rPr lang="fr-FR" sz="2800" spc="-35" err="1">
-                <a:latin typeface="Calibri"/>
-                <a:cs typeface="Calibri"/>
-              </a:rPr>
-              <a:t>sample</a:t>
-            </a:r>
-            <a:r>
-              <a:rPr lang="fr-FR" sz="2800" spc="-35">
-                <a:latin typeface="Calibri"/>
-                <a:cs typeface="Calibri"/>
-              </a:rPr>
-              <a:t> set?</a:t>
-            </a:r>
-          </a:p>
-          <a:p>
-            <a:pPr marL="469288" indent="-457200">
-              <a:lnSpc>
-                <a:spcPts val="2400"/>
-              </a:lnSpc>
-              <a:spcBef>
-                <a:spcPts val="566"/>
-              </a:spcBef>
-              <a:buFont typeface="Arial" panose="020B0604020202020204" pitchFamily="34" charset="0"/>
-              <a:buChar char="•"/>
-              <a:tabLst>
-                <a:tab pos="185772" algn="l"/>
-              </a:tabLst>
-            </a:pPr>
-            <a:r>
-              <a:rPr lang="fr-FR" sz="2800" spc="-35">
-                <a:latin typeface="Calibri"/>
-                <a:cs typeface="Calibri"/>
-              </a:rPr>
-              <a:t>Methods to </a:t>
-            </a:r>
-            <a:r>
-              <a:rPr lang="fr-FR" sz="2800" spc="-35" err="1">
-                <a:latin typeface="Calibri"/>
-                <a:cs typeface="Calibri"/>
-              </a:rPr>
-              <a:t>reduce</a:t>
-            </a:r>
-            <a:r>
-              <a:rPr lang="fr-FR" sz="2800" spc="-35">
-                <a:latin typeface="Calibri"/>
-                <a:cs typeface="Calibri"/>
-              </a:rPr>
-              <a:t> </a:t>
-            </a:r>
-            <a:r>
-              <a:rPr lang="fr-FR" sz="2800" spc="-35" err="1">
-                <a:latin typeface="Calibri"/>
-                <a:cs typeface="Calibri"/>
-              </a:rPr>
-              <a:t>dataset</a:t>
-            </a:r>
-            <a:r>
-              <a:rPr lang="fr-FR" sz="2800" spc="-35">
-                <a:latin typeface="Calibri"/>
-                <a:cs typeface="Calibri"/>
-              </a:rPr>
-              <a:t> size </a:t>
-            </a:r>
-            <a:r>
-              <a:rPr lang="fr-FR" sz="2800" spc="-35" err="1">
-                <a:latin typeface="Calibri"/>
-                <a:cs typeface="Calibri"/>
-              </a:rPr>
-              <a:t>with</a:t>
-            </a:r>
-            <a:r>
-              <a:rPr lang="fr-FR" sz="2800" spc="-35">
-                <a:latin typeface="Calibri"/>
-                <a:cs typeface="Calibri"/>
-              </a:rPr>
-              <a:t> small </a:t>
-            </a:r>
-            <a:r>
-              <a:rPr lang="fr-FR" sz="2800" spc="-35" err="1">
-                <a:latin typeface="Calibri"/>
-                <a:cs typeface="Calibri"/>
-              </a:rPr>
-              <a:t>loss</a:t>
-            </a:r>
-            <a:r>
-              <a:rPr lang="fr-FR" sz="2800" spc="-35">
-                <a:latin typeface="Calibri"/>
-                <a:cs typeface="Calibri"/>
-              </a:rPr>
-              <a:t> of </a:t>
-            </a:r>
-            <a:r>
-              <a:rPr lang="fr-FR" sz="2800" spc="-35" err="1">
-                <a:latin typeface="Calibri"/>
-                <a:cs typeface="Calibri"/>
-              </a:rPr>
-              <a:t>precision</a:t>
-            </a:r>
-            <a:r>
-              <a:rPr lang="fr-FR" sz="2800" spc="-35">
-                <a:latin typeface="Calibri"/>
-                <a:cs typeface="Calibri"/>
-              </a:rPr>
-              <a:t> </a:t>
-            </a:r>
-            <a:r>
-              <a:rPr lang="fr-FR" sz="2800" spc="-35" err="1">
-                <a:latin typeface="Calibri"/>
-                <a:cs typeface="Calibri"/>
-              </a:rPr>
-              <a:t>may</a:t>
-            </a:r>
-            <a:r>
-              <a:rPr lang="fr-FR" sz="2800" spc="-35">
-                <a:latin typeface="Calibri"/>
-                <a:cs typeface="Calibri"/>
-              </a:rPr>
-              <a:t> </a:t>
-            </a:r>
-            <a:r>
-              <a:rPr lang="fr-FR" sz="2800" i="1" spc="-35" err="1">
-                <a:latin typeface="Calibri"/>
-                <a:cs typeface="Calibri"/>
-              </a:rPr>
-              <a:t>improve</a:t>
-            </a:r>
-            <a:r>
-              <a:rPr lang="fr-FR" sz="2800" spc="-35">
-                <a:latin typeface="Calibri"/>
-                <a:cs typeface="Calibri"/>
-              </a:rPr>
-              <a:t> final performances!</a:t>
-            </a:r>
-          </a:p>
-          <a:p>
-            <a:pPr marL="469288" indent="-457200">
-              <a:lnSpc>
-                <a:spcPts val="2400"/>
-              </a:lnSpc>
-              <a:spcBef>
-                <a:spcPts val="566"/>
-              </a:spcBef>
-              <a:buFont typeface="Arial" panose="020B0604020202020204" pitchFamily="34" charset="0"/>
-              <a:buChar char="•"/>
-              <a:tabLst>
-                <a:tab pos="185772" algn="l"/>
-              </a:tabLst>
-            </a:pPr>
-            <a:r>
-              <a:rPr lang="fr-FR" sz="2800" spc="-35">
-                <a:latin typeface="Calibri"/>
-                <a:cs typeface="Calibri"/>
-              </a:rPr>
-              <a:t>Best </a:t>
-            </a:r>
-            <a:r>
-              <a:rPr lang="fr-FR" sz="2800" spc="-35" err="1">
-                <a:latin typeface="Calibri"/>
-                <a:cs typeface="Calibri"/>
-              </a:rPr>
-              <a:t>tradeof</a:t>
-            </a:r>
-            <a:r>
-              <a:rPr lang="fr-FR" sz="2800" spc="-35">
-                <a:latin typeface="Calibri"/>
-                <a:cs typeface="Calibri"/>
-              </a:rPr>
-              <a:t> </a:t>
-            </a:r>
-            <a:r>
-              <a:rPr lang="fr-FR" sz="2800" spc="-35" err="1">
-                <a:latin typeface="Calibri"/>
-                <a:cs typeface="Calibri"/>
-              </a:rPr>
-              <a:t>also</a:t>
-            </a:r>
-            <a:r>
-              <a:rPr lang="fr-FR" sz="2800" spc="-35">
-                <a:latin typeface="Calibri"/>
-                <a:cs typeface="Calibri"/>
-              </a:rPr>
-              <a:t> </a:t>
-            </a:r>
-            <a:r>
-              <a:rPr lang="fr-FR" sz="2800" spc="-35" err="1">
-                <a:latin typeface="Calibri"/>
-                <a:cs typeface="Calibri"/>
-              </a:rPr>
-              <a:t>depends</a:t>
-            </a:r>
-            <a:r>
-              <a:rPr lang="fr-FR" sz="2800" spc="-35">
-                <a:latin typeface="Calibri"/>
-                <a:cs typeface="Calibri"/>
-              </a:rPr>
-              <a:t> on </a:t>
-            </a:r>
-            <a:r>
-              <a:rPr lang="fr-FR" sz="2800" spc="-35" err="1">
-                <a:latin typeface="Calibri"/>
-                <a:cs typeface="Calibri"/>
-              </a:rPr>
-              <a:t>optimization</a:t>
-            </a:r>
-            <a:r>
-              <a:rPr lang="fr-FR" sz="2800" spc="-35">
-                <a:latin typeface="Calibri"/>
-                <a:cs typeface="Calibri"/>
-              </a:rPr>
-              <a:t> </a:t>
-            </a:r>
-            <a:r>
-              <a:rPr lang="fr-FR" sz="2800" spc="-35" err="1">
-                <a:latin typeface="Calibri"/>
-                <a:cs typeface="Calibri"/>
-              </a:rPr>
-              <a:t>algorithm</a:t>
-            </a:r>
-            <a:r>
-              <a:rPr lang="fr-FR" sz="2800" spc="-35">
-                <a:latin typeface="Calibri"/>
-                <a:cs typeface="Calibri"/>
-              </a:rPr>
-              <a:t>.</a:t>
-            </a:r>
-          </a:p>
-          <a:p>
-            <a:pPr marL="12088">
-              <a:lnSpc>
-                <a:spcPts val="2400"/>
-              </a:lnSpc>
-              <a:spcBef>
-                <a:spcPts val="566"/>
-              </a:spcBef>
-              <a:tabLst>
-                <a:tab pos="185772" algn="l"/>
-              </a:tabLst>
-            </a:pPr>
-            <a:endParaRPr lang="fr-FR" sz="2800" spc="-35">
-              <a:latin typeface="Calibri"/>
-              <a:cs typeface="Calibri"/>
-            </a:endParaRPr>
-          </a:p>
-          <a:p>
-            <a:pPr marL="12088">
-              <a:lnSpc>
-                <a:spcPts val="2400"/>
-              </a:lnSpc>
-              <a:spcBef>
-                <a:spcPts val="566"/>
-              </a:spcBef>
-              <a:tabLst>
-                <a:tab pos="185772" algn="l"/>
-              </a:tabLst>
-            </a:pPr>
-            <a:endParaRPr lang="fr-FR" sz="2800" spc="-35">
-              <a:solidFill>
-                <a:srgbClr val="002060"/>
-              </a:solidFill>
-              <a:latin typeface="Calibri"/>
-              <a:cs typeface="Calibri"/>
-            </a:endParaRPr>
-          </a:p>
-        </p:txBody>
-      </p:sp>
-    </p:spTree>
-    <p:extLst>
-      <p:ext uri="{BB962C8B-B14F-4D97-AF65-F5344CB8AC3E}">
-        <p14:creationId xmlns:p14="http://schemas.microsoft.com/office/powerpoint/2010/main" val="310180875"/>
-      </p:ext>
-    </p:extLst>
-  </p:cSld>
-  <p:clrMapOvr>
-    <a:masterClrMapping/>
-  </p:clrMapOvr>
-</p:sld>
-</file>
-
 <file path=ppt/slides/slide2.xml><?xml version="1.0" encoding="utf-8"?>
 <p:sld xmlns:a="http://schemas.openxmlformats.org/drawingml/2006/main" xmlns:r="http://schemas.openxmlformats.org/officeDocument/2006/relationships" xmlns:p="http://schemas.openxmlformats.org/presentationml/2006/main" showMasterSp="0">
   <p:cSld>
@@ -11835,6 +11690,838 @@
 </file>
 
 <file path=ppt/slides/slide20.xml><?xml version="1.0" encoding="utf-8"?>
+<p:sld xmlns:a="http://schemas.openxmlformats.org/drawingml/2006/main" xmlns:r="http://schemas.openxmlformats.org/officeDocument/2006/relationships" xmlns:p="http://schemas.openxmlformats.org/presentationml/2006/main">
+  <p:cSld>
+    <p:spTree>
+      <p:nvGrpSpPr>
+        <p:cNvPr id="1" name=""/>
+        <p:cNvGrpSpPr/>
+        <p:nvPr/>
+      </p:nvGrpSpPr>
+      <p:grpSpPr>
+        <a:xfrm>
+          <a:off x="0" y="0"/>
+          <a:ext cx="0" cy="0"/>
+          <a:chOff x="0" y="0"/>
+          <a:chExt cx="0" cy="0"/>
+        </a:xfrm>
+      </p:grpSpPr>
+      <p:sp>
+        <p:nvSpPr>
+          <p:cNvPr id="3" name="object 3"/>
+          <p:cNvSpPr txBox="1"/>
+          <p:nvPr/>
+        </p:nvSpPr>
+        <p:spPr>
+          <a:xfrm>
+            <a:off x="920750" y="1530350"/>
+            <a:ext cx="10668000" cy="723171"/>
+          </a:xfrm>
+          <a:prstGeom prst="rect">
+            <a:avLst/>
+          </a:prstGeom>
+        </p:spPr>
+        <p:txBody>
+          <a:bodyPr vert="horz" wrap="square" lIns="0" tIns="12724" rIns="0" bIns="0" rtlCol="0">
+            <a:spAutoFit/>
+          </a:bodyPr>
+          <a:lstStyle/>
+          <a:p>
+            <a:pPr marL="12088">
+              <a:lnSpc>
+                <a:spcPts val="2400"/>
+              </a:lnSpc>
+              <a:spcBef>
+                <a:spcPts val="566"/>
+              </a:spcBef>
+              <a:tabLst>
+                <a:tab pos="185772" algn="l"/>
+              </a:tabLst>
+            </a:pPr>
+            <a:r>
+              <a:rPr lang="fr-FR" sz="2800" spc="-35" err="1">
+                <a:solidFill>
+                  <a:srgbClr val="002060"/>
+                </a:solidFill>
+                <a:latin typeface="Calibri"/>
+                <a:cs typeface="Calibri"/>
+              </a:rPr>
+              <a:t>Constrained</a:t>
+            </a:r>
+            <a:r>
+              <a:rPr lang="fr-FR" sz="2800" spc="-35">
+                <a:solidFill>
+                  <a:srgbClr val="002060"/>
+                </a:solidFill>
+                <a:latin typeface="Calibri"/>
+                <a:cs typeface="Calibri"/>
+              </a:rPr>
+              <a:t> by the training time / training ressources</a:t>
+            </a:r>
+          </a:p>
+          <a:p>
+            <a:pPr marL="12088">
+              <a:lnSpc>
+                <a:spcPts val="2400"/>
+              </a:lnSpc>
+              <a:spcBef>
+                <a:spcPts val="566"/>
+              </a:spcBef>
+              <a:tabLst>
+                <a:tab pos="185772" algn="l"/>
+              </a:tabLst>
+            </a:pPr>
+            <a:endParaRPr lang="fr-FR" sz="2800" spc="-35">
+              <a:solidFill>
+                <a:srgbClr val="002060"/>
+              </a:solidFill>
+              <a:latin typeface="Calibri"/>
+              <a:cs typeface="Calibri"/>
+            </a:endParaRPr>
+          </a:p>
+        </p:txBody>
+      </p:sp>
+      <p:sp>
+        <p:nvSpPr>
+          <p:cNvPr id="5" name="Title 1">
+            <a:extLst>
+              <a:ext uri="{FF2B5EF4-FFF2-40B4-BE49-F238E27FC236}">
+                <a16:creationId xmlns:a16="http://schemas.microsoft.com/office/drawing/2014/main" id="{19E3936B-825F-423D-804B-7EA0C48604CA}"/>
+              </a:ext>
+            </a:extLst>
+          </p:cNvPr>
+          <p:cNvSpPr txBox="1">
+            <a:spLocks/>
+          </p:cNvSpPr>
+          <p:nvPr/>
+        </p:nvSpPr>
+        <p:spPr>
+          <a:xfrm>
+            <a:off x="539750" y="500222"/>
+            <a:ext cx="10526554" cy="1326944"/>
+          </a:xfrm>
+          <a:prstGeom prst="rect">
+            <a:avLst/>
+          </a:prstGeom>
+        </p:spPr>
+        <p:txBody>
+          <a:bodyPr/>
+          <a:lstStyle>
+            <a:lvl1pPr algn="l" defTabSz="914400" rtl="0" eaLnBrk="1" latinLnBrk="0" hangingPunct="1">
+              <a:lnSpc>
+                <a:spcPct val="90000"/>
+              </a:lnSpc>
+              <a:spcBef>
+                <a:spcPct val="0"/>
+              </a:spcBef>
+              <a:buNone/>
+              <a:defRPr sz="4400" kern="1200">
+                <a:solidFill>
+                  <a:schemeClr val="tx1"/>
+                </a:solidFill>
+                <a:latin typeface="+mj-lt"/>
+                <a:ea typeface="+mj-ea"/>
+                <a:cs typeface="+mj-cs"/>
+              </a:defRPr>
+            </a:lvl1pPr>
+          </a:lstStyle>
+          <a:p>
+            <a:r>
+              <a:rPr lang="en-US" sz="3600">
+                <a:latin typeface="Verdana" panose="020B0604030504040204" pitchFamily="34" charset="0"/>
+                <a:ea typeface="Verdana" panose="020B0604030504040204" pitchFamily="34" charset="0"/>
+              </a:rPr>
+              <a:t>Large scale learning</a:t>
+            </a:r>
+          </a:p>
+          <a:p>
+            <a:endParaRPr lang="en-US" sz="3600">
+              <a:latin typeface="Verdana" panose="020B0604030504040204" pitchFamily="34" charset="0"/>
+              <a:ea typeface="Verdana" panose="020B0604030504040204" pitchFamily="34" charset="0"/>
+            </a:endParaRPr>
+          </a:p>
+        </p:txBody>
+      </p:sp>
+      <p:sp>
+        <p:nvSpPr>
+          <p:cNvPr id="7" name="object 3">
+            <a:extLst>
+              <a:ext uri="{FF2B5EF4-FFF2-40B4-BE49-F238E27FC236}">
+                <a16:creationId xmlns:a16="http://schemas.microsoft.com/office/drawing/2014/main" id="{CEB5BEE3-E287-4437-AC8E-C5B30176FA46}"/>
+              </a:ext>
+            </a:extLst>
+          </p:cNvPr>
+          <p:cNvSpPr txBox="1"/>
+          <p:nvPr/>
+        </p:nvSpPr>
+        <p:spPr>
+          <a:xfrm>
+            <a:off x="1922304" y="2267491"/>
+            <a:ext cx="9144000" cy="2262054"/>
+          </a:xfrm>
+          <a:prstGeom prst="rect">
+            <a:avLst/>
+          </a:prstGeom>
+        </p:spPr>
+        <p:txBody>
+          <a:bodyPr vert="horz" wrap="square" lIns="0" tIns="12724" rIns="0" bIns="0" rtlCol="0">
+            <a:spAutoFit/>
+          </a:bodyPr>
+          <a:lstStyle/>
+          <a:p>
+            <a:pPr marL="12088">
+              <a:lnSpc>
+                <a:spcPts val="2400"/>
+              </a:lnSpc>
+              <a:spcBef>
+                <a:spcPts val="566"/>
+              </a:spcBef>
+              <a:tabLst>
+                <a:tab pos="185772" algn="l"/>
+              </a:tabLst>
+            </a:pPr>
+            <a:r>
+              <a:rPr lang="fr-FR" sz="2800" spc="-35">
+                <a:latin typeface="Calibri"/>
+                <a:cs typeface="Calibri"/>
+              </a:rPr>
+              <a:t>Example:  </a:t>
+            </a:r>
+            <a:r>
+              <a:rPr lang="fr-FR" sz="2800" spc="-35" err="1">
+                <a:latin typeface="Calibri"/>
+                <a:cs typeface="Calibri"/>
+              </a:rPr>
+              <a:t>OpenAI</a:t>
+            </a:r>
+            <a:r>
+              <a:rPr lang="fr-FR" sz="2800" spc="-35">
+                <a:latin typeface="Calibri"/>
+                <a:cs typeface="Calibri"/>
+              </a:rPr>
+              <a:t> GPT-3 </a:t>
+            </a:r>
+            <a:r>
+              <a:rPr lang="fr-FR" sz="2800" spc="-35" err="1">
+                <a:latin typeface="Calibri"/>
+                <a:cs typeface="Calibri"/>
+              </a:rPr>
+              <a:t>text</a:t>
+            </a:r>
+            <a:r>
+              <a:rPr lang="fr-FR" sz="2800" spc="-35">
+                <a:latin typeface="Calibri"/>
+                <a:cs typeface="Calibri"/>
+              </a:rPr>
+              <a:t> model</a:t>
+            </a:r>
+          </a:p>
+          <a:p>
+            <a:pPr marL="12088">
+              <a:lnSpc>
+                <a:spcPts val="2400"/>
+              </a:lnSpc>
+              <a:spcBef>
+                <a:spcPts val="566"/>
+              </a:spcBef>
+              <a:tabLst>
+                <a:tab pos="185772" algn="l"/>
+              </a:tabLst>
+            </a:pPr>
+            <a:endParaRPr lang="fr-FR" sz="2800" spc="-35">
+              <a:latin typeface="Calibri"/>
+              <a:cs typeface="Calibri"/>
+            </a:endParaRPr>
+          </a:p>
+          <a:p>
+            <a:pPr marL="469288" indent="-457200">
+              <a:lnSpc>
+                <a:spcPts val="2400"/>
+              </a:lnSpc>
+              <a:spcBef>
+                <a:spcPts val="566"/>
+              </a:spcBef>
+              <a:buFont typeface="Arial" panose="020B0604020202020204" pitchFamily="34" charset="0"/>
+              <a:buChar char="•"/>
+              <a:tabLst>
+                <a:tab pos="185772" algn="l"/>
+              </a:tabLst>
+            </a:pPr>
+            <a:r>
+              <a:rPr lang="en-US" sz="2800"/>
+              <a:t>Training set: 45 TB text data, mostly crawled from internet.</a:t>
+            </a:r>
+            <a:endParaRPr lang="fr-FR" sz="2800" spc="-35">
+              <a:latin typeface="Calibri"/>
+              <a:cs typeface="Calibri"/>
+            </a:endParaRPr>
+          </a:p>
+          <a:p>
+            <a:pPr marL="469288" indent="-457200">
+              <a:lnSpc>
+                <a:spcPts val="2400"/>
+              </a:lnSpc>
+              <a:spcBef>
+                <a:spcPts val="566"/>
+              </a:spcBef>
+              <a:buFont typeface="Arial" panose="020B0604020202020204" pitchFamily="34" charset="0"/>
+              <a:buChar char="•"/>
+              <a:tabLst>
+                <a:tab pos="185772" algn="l"/>
+              </a:tabLst>
+            </a:pPr>
+            <a:r>
+              <a:rPr lang="fr-FR" sz="2800"/>
+              <a:t>Training </a:t>
+            </a:r>
+            <a:r>
+              <a:rPr lang="fr-FR" sz="2800" err="1"/>
+              <a:t>cost</a:t>
+            </a:r>
+            <a:r>
+              <a:rPr lang="fr-FR" sz="2800"/>
+              <a:t> </a:t>
+            </a:r>
+            <a:r>
+              <a:rPr lang="fr-FR" sz="2800" err="1"/>
+              <a:t>estimated</a:t>
+            </a:r>
+            <a:r>
+              <a:rPr lang="fr-FR" sz="2800"/>
+              <a:t> to </a:t>
+            </a:r>
+            <a:r>
+              <a:rPr lang="fr-FR" sz="2800" err="1"/>
+              <a:t>several</a:t>
+            </a:r>
+            <a:r>
+              <a:rPr lang="fr-FR" sz="2800"/>
+              <a:t> M</a:t>
+            </a:r>
+            <a:r>
+              <a:rPr lang="en-US" sz="2800"/>
+              <a:t>€</a:t>
+            </a:r>
+          </a:p>
+          <a:p>
+            <a:pPr marL="469288" indent="-457200">
+              <a:lnSpc>
+                <a:spcPts val="2400"/>
+              </a:lnSpc>
+              <a:spcBef>
+                <a:spcPts val="566"/>
+              </a:spcBef>
+              <a:buFont typeface="Arial" panose="020B0604020202020204" pitchFamily="34" charset="0"/>
+              <a:buChar char="•"/>
+              <a:tabLst>
+                <a:tab pos="185772" algn="l"/>
+              </a:tabLst>
+            </a:pPr>
+            <a:endParaRPr lang="fr-FR" sz="2800" spc="-35">
+              <a:latin typeface="Calibri"/>
+              <a:cs typeface="Calibri"/>
+            </a:endParaRPr>
+          </a:p>
+          <a:p>
+            <a:pPr marL="12088">
+              <a:lnSpc>
+                <a:spcPts val="2400"/>
+              </a:lnSpc>
+              <a:spcBef>
+                <a:spcPts val="566"/>
+              </a:spcBef>
+              <a:tabLst>
+                <a:tab pos="185772" algn="l"/>
+              </a:tabLst>
+            </a:pPr>
+            <a:r>
+              <a:rPr lang="fr-FR" sz="2800" spc="-35">
+                <a:latin typeface="Calibri"/>
+                <a:cs typeface="Calibri"/>
+              </a:rPr>
+              <a:t>  </a:t>
+            </a:r>
+          </a:p>
+        </p:txBody>
+      </p:sp>
+      <p:sp>
+        <p:nvSpPr>
+          <p:cNvPr id="8" name="object 3">
+            <a:extLst>
+              <a:ext uri="{FF2B5EF4-FFF2-40B4-BE49-F238E27FC236}">
+                <a16:creationId xmlns:a16="http://schemas.microsoft.com/office/drawing/2014/main" id="{E6F57EEC-0F5B-41C7-A0E0-0F4DB5D00744}"/>
+              </a:ext>
+            </a:extLst>
+          </p:cNvPr>
+          <p:cNvSpPr txBox="1"/>
+          <p:nvPr/>
+        </p:nvSpPr>
+        <p:spPr>
+          <a:xfrm>
+            <a:off x="561340" y="4273550"/>
+            <a:ext cx="11201400" cy="3262328"/>
+          </a:xfrm>
+          <a:prstGeom prst="rect">
+            <a:avLst/>
+          </a:prstGeom>
+        </p:spPr>
+        <p:txBody>
+          <a:bodyPr vert="horz" wrap="square" lIns="0" tIns="12724" rIns="0" bIns="0" rtlCol="0">
+            <a:spAutoFit/>
+          </a:bodyPr>
+          <a:lstStyle/>
+          <a:p>
+            <a:pPr marL="12088">
+              <a:lnSpc>
+                <a:spcPts val="2400"/>
+              </a:lnSpc>
+              <a:spcBef>
+                <a:spcPts val="566"/>
+              </a:spcBef>
+              <a:tabLst>
+                <a:tab pos="185772" algn="l"/>
+              </a:tabLst>
+            </a:pPr>
+            <a:r>
+              <a:rPr lang="fr-FR" sz="2800" spc="-35" err="1">
+                <a:latin typeface="Calibri"/>
+                <a:cs typeface="Calibri"/>
+              </a:rPr>
+              <a:t>Computing</a:t>
+            </a:r>
+            <a:r>
+              <a:rPr lang="fr-FR" sz="2800" spc="-35">
+                <a:latin typeface="Calibri"/>
+                <a:cs typeface="Calibri"/>
+              </a:rPr>
+              <a:t> time </a:t>
+            </a:r>
+            <a:r>
+              <a:rPr lang="fr-FR" sz="2800" spc="-35" err="1">
+                <a:latin typeface="Calibri"/>
+                <a:cs typeface="Calibri"/>
+              </a:rPr>
+              <a:t>depends</a:t>
+            </a:r>
+            <a:r>
+              <a:rPr lang="fr-FR" sz="2800" spc="-35">
+                <a:latin typeface="Calibri"/>
+                <a:cs typeface="Calibri"/>
+              </a:rPr>
+              <a:t> on n, </a:t>
+            </a:r>
+            <a:r>
+              <a:rPr lang="en-US" sz="2800"/>
+              <a:t>ℱ</a:t>
+            </a:r>
+            <a:r>
+              <a:rPr lang="fr-FR" sz="2800" spc="-35">
+                <a:latin typeface="Calibri"/>
+                <a:cs typeface="Calibri"/>
+              </a:rPr>
+              <a:t> and </a:t>
+            </a:r>
+            <a:r>
+              <a:rPr lang="el-GR" sz="2800"/>
+              <a:t>ρ</a:t>
+            </a:r>
+            <a:r>
+              <a:rPr lang="fr-FR" sz="2800"/>
+              <a:t>. </a:t>
+            </a:r>
+          </a:p>
+          <a:p>
+            <a:pPr marL="12088">
+              <a:lnSpc>
+                <a:spcPts val="2400"/>
+              </a:lnSpc>
+              <a:spcBef>
+                <a:spcPts val="566"/>
+              </a:spcBef>
+              <a:tabLst>
+                <a:tab pos="185772" algn="l"/>
+              </a:tabLst>
+            </a:pPr>
+            <a:endParaRPr lang="fr-FR" sz="2800"/>
+          </a:p>
+          <a:p>
+            <a:pPr marL="469288" indent="-457200">
+              <a:lnSpc>
+                <a:spcPts val="2400"/>
+              </a:lnSpc>
+              <a:spcBef>
+                <a:spcPts val="566"/>
+              </a:spcBef>
+              <a:buFont typeface="Arial" panose="020B0604020202020204" pitchFamily="34" charset="0"/>
+              <a:buChar char="•"/>
+              <a:tabLst>
+                <a:tab pos="185772" algn="l"/>
+              </a:tabLst>
+            </a:pPr>
+            <a:r>
+              <a:rPr lang="fr-FR" sz="2800" spc="-35" err="1">
+                <a:latin typeface="Calibri"/>
+                <a:cs typeface="Calibri"/>
+              </a:rPr>
+              <a:t>Should</a:t>
+            </a:r>
+            <a:r>
+              <a:rPr lang="fr-FR" sz="2800" spc="-35">
+                <a:latin typeface="Calibri"/>
+                <a:cs typeface="Calibri"/>
+              </a:rPr>
+              <a:t> </a:t>
+            </a:r>
+            <a:r>
+              <a:rPr lang="fr-FR" sz="2800" spc="-35" err="1">
+                <a:latin typeface="Calibri"/>
+                <a:cs typeface="Calibri"/>
+              </a:rPr>
+              <a:t>you</a:t>
+            </a:r>
+            <a:r>
+              <a:rPr lang="fr-FR" sz="2800" spc="-35">
+                <a:latin typeface="Calibri"/>
+                <a:cs typeface="Calibri"/>
+              </a:rPr>
+              <a:t> use more </a:t>
+            </a:r>
+            <a:r>
+              <a:rPr lang="fr-FR" sz="2800" spc="-35" err="1">
+                <a:latin typeface="Calibri"/>
+                <a:cs typeface="Calibri"/>
+              </a:rPr>
+              <a:t>samples</a:t>
+            </a:r>
+            <a:r>
+              <a:rPr lang="fr-FR" sz="2800" spc="-35">
+                <a:latin typeface="Calibri"/>
+                <a:cs typeface="Calibri"/>
+              </a:rPr>
+              <a:t> or </a:t>
+            </a:r>
+            <a:r>
+              <a:rPr lang="fr-FR" sz="2800" spc="-35" err="1">
+                <a:latin typeface="Calibri"/>
+                <a:cs typeface="Calibri"/>
+              </a:rPr>
+              <a:t>spend</a:t>
+            </a:r>
+            <a:r>
+              <a:rPr lang="fr-FR" sz="2800" spc="-35">
+                <a:latin typeface="Calibri"/>
+                <a:cs typeface="Calibri"/>
+              </a:rPr>
+              <a:t> more time </a:t>
+            </a:r>
+            <a:r>
+              <a:rPr lang="fr-FR" sz="2800" spc="-35" err="1">
+                <a:latin typeface="Calibri"/>
+                <a:cs typeface="Calibri"/>
+              </a:rPr>
+              <a:t>optimizing</a:t>
+            </a:r>
+            <a:r>
+              <a:rPr lang="fr-FR" sz="2800" spc="-35">
+                <a:latin typeface="Calibri"/>
+                <a:cs typeface="Calibri"/>
+              </a:rPr>
+              <a:t> on </a:t>
+            </a:r>
+            <a:r>
+              <a:rPr lang="fr-FR" sz="2800" spc="-35" err="1">
+                <a:latin typeface="Calibri"/>
+                <a:cs typeface="Calibri"/>
+              </a:rPr>
+              <a:t>smaller</a:t>
+            </a:r>
+            <a:r>
+              <a:rPr lang="fr-FR" sz="2800" spc="-35">
+                <a:latin typeface="Calibri"/>
+                <a:cs typeface="Calibri"/>
+              </a:rPr>
+              <a:t> </a:t>
+            </a:r>
+            <a:r>
+              <a:rPr lang="fr-FR" sz="2800" spc="-35" err="1">
+                <a:latin typeface="Calibri"/>
+                <a:cs typeface="Calibri"/>
+              </a:rPr>
+              <a:t>sample</a:t>
+            </a:r>
+            <a:r>
+              <a:rPr lang="fr-FR" sz="2800" spc="-35">
+                <a:latin typeface="Calibri"/>
+                <a:cs typeface="Calibri"/>
+              </a:rPr>
+              <a:t> set?</a:t>
+            </a:r>
+          </a:p>
+          <a:p>
+            <a:pPr marL="469288" indent="-457200">
+              <a:lnSpc>
+                <a:spcPts val="2400"/>
+              </a:lnSpc>
+              <a:spcBef>
+                <a:spcPts val="566"/>
+              </a:spcBef>
+              <a:buFont typeface="Arial" panose="020B0604020202020204" pitchFamily="34" charset="0"/>
+              <a:buChar char="•"/>
+              <a:tabLst>
+                <a:tab pos="185772" algn="l"/>
+              </a:tabLst>
+            </a:pPr>
+            <a:r>
+              <a:rPr lang="fr-FR" sz="2800" spc="-35">
+                <a:latin typeface="Calibri"/>
+                <a:cs typeface="Calibri"/>
+              </a:rPr>
+              <a:t>Methods to </a:t>
+            </a:r>
+            <a:r>
+              <a:rPr lang="fr-FR" sz="2800" spc="-35" err="1">
+                <a:latin typeface="Calibri"/>
+                <a:cs typeface="Calibri"/>
+              </a:rPr>
+              <a:t>reduce</a:t>
+            </a:r>
+            <a:r>
+              <a:rPr lang="fr-FR" sz="2800" spc="-35">
+                <a:latin typeface="Calibri"/>
+                <a:cs typeface="Calibri"/>
+              </a:rPr>
+              <a:t> </a:t>
+            </a:r>
+            <a:r>
+              <a:rPr lang="fr-FR" sz="2800" spc="-35" err="1">
+                <a:latin typeface="Calibri"/>
+                <a:cs typeface="Calibri"/>
+              </a:rPr>
+              <a:t>dataset</a:t>
+            </a:r>
+            <a:r>
+              <a:rPr lang="fr-FR" sz="2800" spc="-35">
+                <a:latin typeface="Calibri"/>
+                <a:cs typeface="Calibri"/>
+              </a:rPr>
+              <a:t> size </a:t>
+            </a:r>
+            <a:r>
+              <a:rPr lang="fr-FR" sz="2800" spc="-35" err="1">
+                <a:latin typeface="Calibri"/>
+                <a:cs typeface="Calibri"/>
+              </a:rPr>
+              <a:t>with</a:t>
+            </a:r>
+            <a:r>
+              <a:rPr lang="fr-FR" sz="2800" spc="-35">
+                <a:latin typeface="Calibri"/>
+                <a:cs typeface="Calibri"/>
+              </a:rPr>
+              <a:t> small </a:t>
+            </a:r>
+            <a:r>
+              <a:rPr lang="fr-FR" sz="2800" spc="-35" err="1">
+                <a:latin typeface="Calibri"/>
+                <a:cs typeface="Calibri"/>
+              </a:rPr>
+              <a:t>loss</a:t>
+            </a:r>
+            <a:r>
+              <a:rPr lang="fr-FR" sz="2800" spc="-35">
+                <a:latin typeface="Calibri"/>
+                <a:cs typeface="Calibri"/>
+              </a:rPr>
+              <a:t> of </a:t>
+            </a:r>
+            <a:r>
+              <a:rPr lang="fr-FR" sz="2800" spc="-35" err="1">
+                <a:latin typeface="Calibri"/>
+                <a:cs typeface="Calibri"/>
+              </a:rPr>
+              <a:t>precision</a:t>
+            </a:r>
+            <a:r>
+              <a:rPr lang="fr-FR" sz="2800" spc="-35">
+                <a:latin typeface="Calibri"/>
+                <a:cs typeface="Calibri"/>
+              </a:rPr>
+              <a:t> </a:t>
+            </a:r>
+            <a:r>
+              <a:rPr lang="fr-FR" sz="2800" spc="-35" err="1">
+                <a:latin typeface="Calibri"/>
+                <a:cs typeface="Calibri"/>
+              </a:rPr>
+              <a:t>may</a:t>
+            </a:r>
+            <a:r>
+              <a:rPr lang="fr-FR" sz="2800" spc="-35">
+                <a:latin typeface="Calibri"/>
+                <a:cs typeface="Calibri"/>
+              </a:rPr>
+              <a:t> </a:t>
+            </a:r>
+            <a:r>
+              <a:rPr lang="fr-FR" sz="2800" i="1" spc="-35" err="1">
+                <a:latin typeface="Calibri"/>
+                <a:cs typeface="Calibri"/>
+              </a:rPr>
+              <a:t>improve</a:t>
+            </a:r>
+            <a:r>
+              <a:rPr lang="fr-FR" sz="2800" spc="-35">
+                <a:latin typeface="Calibri"/>
+                <a:cs typeface="Calibri"/>
+              </a:rPr>
+              <a:t> final performances!</a:t>
+            </a:r>
+          </a:p>
+          <a:p>
+            <a:pPr marL="469288" indent="-457200">
+              <a:lnSpc>
+                <a:spcPts val="2400"/>
+              </a:lnSpc>
+              <a:spcBef>
+                <a:spcPts val="566"/>
+              </a:spcBef>
+              <a:buFont typeface="Arial" panose="020B0604020202020204" pitchFamily="34" charset="0"/>
+              <a:buChar char="•"/>
+              <a:tabLst>
+                <a:tab pos="185772" algn="l"/>
+              </a:tabLst>
+            </a:pPr>
+            <a:r>
+              <a:rPr lang="fr-FR" sz="2800" spc="-35">
+                <a:latin typeface="Calibri"/>
+                <a:cs typeface="Calibri"/>
+              </a:rPr>
+              <a:t>Best </a:t>
+            </a:r>
+            <a:r>
+              <a:rPr lang="fr-FR" sz="2800" spc="-35" err="1">
+                <a:latin typeface="Calibri"/>
+                <a:cs typeface="Calibri"/>
+              </a:rPr>
+              <a:t>tradeof</a:t>
+            </a:r>
+            <a:r>
+              <a:rPr lang="fr-FR" sz="2800" spc="-35">
+                <a:latin typeface="Calibri"/>
+                <a:cs typeface="Calibri"/>
+              </a:rPr>
+              <a:t> </a:t>
+            </a:r>
+            <a:r>
+              <a:rPr lang="fr-FR" sz="2800" spc="-35" err="1">
+                <a:latin typeface="Calibri"/>
+                <a:cs typeface="Calibri"/>
+              </a:rPr>
+              <a:t>also</a:t>
+            </a:r>
+            <a:r>
+              <a:rPr lang="fr-FR" sz="2800" spc="-35">
+                <a:latin typeface="Calibri"/>
+                <a:cs typeface="Calibri"/>
+              </a:rPr>
+              <a:t> </a:t>
+            </a:r>
+            <a:r>
+              <a:rPr lang="fr-FR" sz="2800" spc="-35" err="1">
+                <a:latin typeface="Calibri"/>
+                <a:cs typeface="Calibri"/>
+              </a:rPr>
+              <a:t>depends</a:t>
+            </a:r>
+            <a:r>
+              <a:rPr lang="fr-FR" sz="2800" spc="-35">
+                <a:latin typeface="Calibri"/>
+                <a:cs typeface="Calibri"/>
+              </a:rPr>
+              <a:t> on </a:t>
+            </a:r>
+            <a:r>
+              <a:rPr lang="fr-FR" sz="2800" spc="-35" err="1">
+                <a:latin typeface="Calibri"/>
+                <a:cs typeface="Calibri"/>
+              </a:rPr>
+              <a:t>optimization</a:t>
+            </a:r>
+            <a:r>
+              <a:rPr lang="fr-FR" sz="2800" spc="-35">
+                <a:latin typeface="Calibri"/>
+                <a:cs typeface="Calibri"/>
+              </a:rPr>
+              <a:t> </a:t>
+            </a:r>
+            <a:r>
+              <a:rPr lang="fr-FR" sz="2800" spc="-35" err="1">
+                <a:latin typeface="Calibri"/>
+                <a:cs typeface="Calibri"/>
+              </a:rPr>
+              <a:t>algorithm</a:t>
+            </a:r>
+            <a:r>
+              <a:rPr lang="fr-FR" sz="2800" spc="-35">
+                <a:latin typeface="Calibri"/>
+                <a:cs typeface="Calibri"/>
+              </a:rPr>
+              <a:t>.</a:t>
+            </a:r>
+          </a:p>
+          <a:p>
+            <a:pPr marL="12088">
+              <a:lnSpc>
+                <a:spcPts val="2400"/>
+              </a:lnSpc>
+              <a:spcBef>
+                <a:spcPts val="566"/>
+              </a:spcBef>
+              <a:tabLst>
+                <a:tab pos="185772" algn="l"/>
+              </a:tabLst>
+            </a:pPr>
+            <a:endParaRPr lang="fr-FR" sz="2800" spc="-35">
+              <a:latin typeface="Calibri"/>
+              <a:cs typeface="Calibri"/>
+            </a:endParaRPr>
+          </a:p>
+          <a:p>
+            <a:pPr marL="12088">
+              <a:lnSpc>
+                <a:spcPts val="2400"/>
+              </a:lnSpc>
+              <a:spcBef>
+                <a:spcPts val="566"/>
+              </a:spcBef>
+              <a:tabLst>
+                <a:tab pos="185772" algn="l"/>
+              </a:tabLst>
+            </a:pPr>
+            <a:endParaRPr lang="fr-FR" sz="2800" spc="-35">
+              <a:solidFill>
+                <a:srgbClr val="002060"/>
+              </a:solidFill>
+              <a:latin typeface="Calibri"/>
+              <a:cs typeface="Calibri"/>
+            </a:endParaRPr>
+          </a:p>
+        </p:txBody>
+      </p:sp>
+    </p:spTree>
+    <p:extLst>
+      <p:ext uri="{BB962C8B-B14F-4D97-AF65-F5344CB8AC3E}">
+        <p14:creationId xmlns:p14="http://schemas.microsoft.com/office/powerpoint/2010/main" val="310180875"/>
+      </p:ext>
+    </p:extLst>
+  </p:cSld>
+  <p:clrMapOvr>
+    <a:masterClrMapping/>
+  </p:clrMapOvr>
+</p:sld>
+</file>
+
+<file path=ppt/slides/slide21.xml><?xml version="1.0" encoding="utf-8"?>
 <p:sld xmlns:a="http://schemas.openxmlformats.org/drawingml/2006/main" xmlns:r="http://schemas.openxmlformats.org/officeDocument/2006/relationships" xmlns:p="http://schemas.openxmlformats.org/presentationml/2006/main">
   <p:cSld>
     <p:spTree>
@@ -12226,269 +12913,6 @@
               <a:t>TestSet</a:t>
             </a:r>
             <a:endParaRPr lang="fr-FR" sz="1600"/>
-          </a:p>
-        </p:txBody>
-      </p:sp>
-    </p:spTree>
-  </p:cSld>
-  <p:clrMapOvr>
-    <a:masterClrMapping/>
-  </p:clrMapOvr>
-</p:sld>
-</file>
-
-<file path=ppt/slides/slide21.xml><?xml version="1.0" encoding="utf-8"?>
-<p:sld xmlns:a="http://schemas.openxmlformats.org/drawingml/2006/main" xmlns:r="http://schemas.openxmlformats.org/officeDocument/2006/relationships" xmlns:p="http://schemas.openxmlformats.org/presentationml/2006/main">
-  <p:cSld>
-    <p:spTree>
-      <p:nvGrpSpPr>
-        <p:cNvPr id="1" name=""/>
-        <p:cNvGrpSpPr/>
-        <p:nvPr/>
-      </p:nvGrpSpPr>
-      <p:grpSpPr>
-        <a:xfrm>
-          <a:off x="0" y="0"/>
-          <a:ext cx="0" cy="0"/>
-          <a:chOff x="0" y="0"/>
-          <a:chExt cx="0" cy="0"/>
-        </a:xfrm>
-      </p:grpSpPr>
-      <p:sp>
-        <p:nvSpPr>
-          <p:cNvPr id="3" name="object 3"/>
-          <p:cNvSpPr/>
-          <p:nvPr/>
-        </p:nvSpPr>
-        <p:spPr>
-          <a:xfrm>
-            <a:off x="3561281" y="1927571"/>
-            <a:ext cx="4869222" cy="3001587"/>
-          </a:xfrm>
-          <a:prstGeom prst="rect">
-            <a:avLst/>
-          </a:prstGeom>
-          <a:blipFill>
-            <a:blip r:embed="rId2" cstate="print"/>
-            <a:stretch>
-              <a:fillRect/>
-            </a:stretch>
-          </a:blipFill>
-        </p:spPr>
-        <p:txBody>
-          <a:bodyPr wrap="square" lIns="0" tIns="0" rIns="0" bIns="0" rtlCol="0"/>
-          <a:lstStyle/>
-          <a:p>
-            <a:endParaRPr sz="1803"/>
-          </a:p>
-        </p:txBody>
-      </p:sp>
-      <p:sp>
-        <p:nvSpPr>
-          <p:cNvPr id="4" name="object 4"/>
-          <p:cNvSpPr/>
-          <p:nvPr/>
-        </p:nvSpPr>
-        <p:spPr>
-          <a:xfrm>
-            <a:off x="3922047" y="1783328"/>
-            <a:ext cx="5267537" cy="2303975"/>
-          </a:xfrm>
-          <a:prstGeom prst="rect">
-            <a:avLst/>
-          </a:prstGeom>
-          <a:blipFill>
-            <a:blip r:embed="rId3" cstate="print"/>
-            <a:stretch>
-              <a:fillRect/>
-            </a:stretch>
-          </a:blipFill>
-        </p:spPr>
-        <p:txBody>
-          <a:bodyPr wrap="square" lIns="0" tIns="0" rIns="0" bIns="0" rtlCol="0"/>
-          <a:lstStyle/>
-          <a:p>
-            <a:endParaRPr sz="1803"/>
-          </a:p>
-        </p:txBody>
-      </p:sp>
-      <p:sp>
-        <p:nvSpPr>
-          <p:cNvPr id="5" name="object 5"/>
-          <p:cNvSpPr txBox="1"/>
-          <p:nvPr/>
-        </p:nvSpPr>
-        <p:spPr>
-          <a:xfrm>
-            <a:off x="2230736" y="5488416"/>
-            <a:ext cx="3384456" cy="346080"/>
-          </a:xfrm>
-          <a:prstGeom prst="rect">
-            <a:avLst/>
-          </a:prstGeom>
-        </p:spPr>
-        <p:txBody>
-          <a:bodyPr vert="horz" wrap="square" lIns="0" tIns="12724" rIns="0" bIns="0" rtlCol="0">
-            <a:spAutoFit/>
-          </a:bodyPr>
-          <a:lstStyle/>
-          <a:p>
-            <a:pPr marL="185136" indent="-173048">
-              <a:spcBef>
-                <a:spcPts val="100"/>
-              </a:spcBef>
-              <a:buFont typeface="Arial"/>
-              <a:buChar char="•"/>
-              <a:tabLst>
-                <a:tab pos="185772" algn="l"/>
-              </a:tabLst>
-            </a:pPr>
-            <a:r>
-              <a:rPr sz="2104" spc="-30">
-                <a:latin typeface="Calibri"/>
-                <a:cs typeface="Calibri"/>
-              </a:rPr>
-              <a:t>Vary </a:t>
-            </a:r>
-            <a:r>
-              <a:rPr sz="2104" spc="-5">
-                <a:latin typeface="Calibri"/>
-                <a:cs typeface="Calibri"/>
-              </a:rPr>
-              <a:t>the number of</a:t>
-            </a:r>
-            <a:r>
-              <a:rPr sz="2104" spc="-45">
-                <a:latin typeface="Calibri"/>
-                <a:cs typeface="Calibri"/>
-              </a:rPr>
-              <a:t> </a:t>
-            </a:r>
-            <a:r>
-              <a:rPr sz="2104" spc="-10">
-                <a:latin typeface="Calibri"/>
-                <a:cs typeface="Calibri"/>
-              </a:rPr>
-              <a:t>examples</a:t>
-            </a:r>
-            <a:endParaRPr sz="2104">
-              <a:latin typeface="Calibri"/>
-              <a:cs typeface="Calibri"/>
-            </a:endParaRPr>
-          </a:p>
-        </p:txBody>
-      </p:sp>
-      <p:sp>
-        <p:nvSpPr>
-          <p:cNvPr id="6" name="object 2">
-            <a:extLst>
-              <a:ext uri="{FF2B5EF4-FFF2-40B4-BE49-F238E27FC236}">
-                <a16:creationId xmlns:a16="http://schemas.microsoft.com/office/drawing/2014/main" id="{EBEB8BB8-8870-4311-9F04-8F9514659CC8}"/>
-              </a:ext>
-            </a:extLst>
-          </p:cNvPr>
-          <p:cNvSpPr txBox="1"/>
-          <p:nvPr/>
-        </p:nvSpPr>
-        <p:spPr>
-          <a:xfrm>
-            <a:off x="6254750" y="4943558"/>
-            <a:ext cx="6705600" cy="259686"/>
-          </a:xfrm>
-          <a:prstGeom prst="rect">
-            <a:avLst/>
-          </a:prstGeom>
-        </p:spPr>
-        <p:txBody>
-          <a:bodyPr vert="horz" wrap="square" lIns="0" tIns="13335" rIns="0" bIns="0" rtlCol="0">
-            <a:spAutoFit/>
-          </a:bodyPr>
-          <a:lstStyle/>
-          <a:p>
-            <a:pPr>
-              <a:lnSpc>
-                <a:spcPct val="100000"/>
-              </a:lnSpc>
-              <a:spcBef>
-                <a:spcPts val="55"/>
-              </a:spcBef>
-            </a:pPr>
-            <a:r>
-              <a:rPr lang="en-US" sz="1600" b="0" i="0">
-                <a:solidFill>
-                  <a:srgbClr val="202124"/>
-                </a:solidFill>
-                <a:effectLst/>
-                <a:latin typeface="arial" panose="020B0604020202020204" pitchFamily="34" charset="0"/>
-              </a:rPr>
-              <a:t>Pushing optimization further, not changing n or </a:t>
-            </a:r>
-            <a:r>
-              <a:rPr lang="en-US" sz="1600"/>
-              <a:t>ℱ</a:t>
-            </a:r>
-            <a:endParaRPr lang="fr-FR" sz="1600"/>
-          </a:p>
-        </p:txBody>
-      </p:sp>
-      <p:sp>
-        <p:nvSpPr>
-          <p:cNvPr id="9" name="Title 1">
-            <a:extLst>
-              <a:ext uri="{FF2B5EF4-FFF2-40B4-BE49-F238E27FC236}">
-                <a16:creationId xmlns:a16="http://schemas.microsoft.com/office/drawing/2014/main" id="{92C66DE4-9D3B-42EA-B2EE-C6EDAFA2C2DA}"/>
-              </a:ext>
-            </a:extLst>
-          </p:cNvPr>
-          <p:cNvSpPr txBox="1">
-            <a:spLocks/>
-          </p:cNvSpPr>
-          <p:nvPr/>
-        </p:nvSpPr>
-        <p:spPr>
-          <a:xfrm>
-            <a:off x="1678146" y="387350"/>
-            <a:ext cx="9529604" cy="1143000"/>
-          </a:xfrm>
-          <a:prstGeom prst="rect">
-            <a:avLst/>
-          </a:prstGeom>
-        </p:spPr>
-        <p:txBody>
-          <a:bodyPr/>
-          <a:lstStyle>
-            <a:lvl1pPr algn="l" defTabSz="914400" rtl="0" eaLnBrk="1" latinLnBrk="0" hangingPunct="1">
-              <a:lnSpc>
-                <a:spcPct val="90000"/>
-              </a:lnSpc>
-              <a:spcBef>
-                <a:spcPct val="0"/>
-              </a:spcBef>
-              <a:buNone/>
-              <a:defRPr sz="4400" kern="1200">
-                <a:solidFill>
-                  <a:schemeClr val="tx1"/>
-                </a:solidFill>
-                <a:latin typeface="+mj-lt"/>
-                <a:ea typeface="+mj-ea"/>
-                <a:cs typeface="+mj-cs"/>
-              </a:defRPr>
-            </a:lvl1pPr>
-          </a:lstStyle>
-          <a:p>
-            <a:r>
-              <a:rPr lang="en-US" sz="3600">
-                <a:latin typeface="Verdana" panose="020B0604030504040204" pitchFamily="34" charset="0"/>
-                <a:ea typeface="Verdana" panose="020B0604030504040204" pitchFamily="34" charset="0"/>
-              </a:rPr>
-              <a:t>Test error versus computing time</a:t>
-            </a:r>
-          </a:p>
-          <a:p>
-            <a:endParaRPr lang="en-US" sz="3600">
-              <a:latin typeface="Verdana" panose="020B0604030504040204" pitchFamily="34" charset="0"/>
-              <a:ea typeface="Verdana" panose="020B0604030504040204" pitchFamily="34" charset="0"/>
-            </a:endParaRPr>
           </a:p>
         </p:txBody>
       </p:sp>
@@ -12549,86 +12973,13 @@
       <p:sp>
         <p:nvSpPr>
           <p:cNvPr id="4" name="object 4"/>
-          <p:cNvSpPr txBox="1"/>
-          <p:nvPr/>
-        </p:nvSpPr>
-        <p:spPr>
-          <a:xfrm>
-            <a:off x="2230736" y="5488416"/>
-            <a:ext cx="6226254" cy="346080"/>
-          </a:xfrm>
-          <a:prstGeom prst="rect">
-            <a:avLst/>
-          </a:prstGeom>
-        </p:spPr>
-        <p:txBody>
-          <a:bodyPr vert="horz" wrap="square" lIns="0" tIns="12724" rIns="0" bIns="0" rtlCol="0">
-            <a:spAutoFit/>
-          </a:bodyPr>
-          <a:lstStyle/>
-          <a:p>
-            <a:pPr marL="185136" indent="-173048">
-              <a:spcBef>
-                <a:spcPts val="100"/>
-              </a:spcBef>
-              <a:buFont typeface="Arial"/>
-              <a:buChar char="•"/>
-              <a:tabLst>
-                <a:tab pos="185772" algn="l"/>
-              </a:tabLst>
-            </a:pPr>
-            <a:r>
-              <a:rPr sz="2104" spc="-30">
-                <a:latin typeface="Calibri"/>
-                <a:cs typeface="Calibri"/>
-              </a:rPr>
-              <a:t>Vary </a:t>
-            </a:r>
-            <a:r>
-              <a:rPr sz="2104" spc="-5">
-                <a:latin typeface="Calibri"/>
-                <a:cs typeface="Calibri"/>
-              </a:rPr>
-              <a:t>the number of </a:t>
-            </a:r>
-            <a:r>
-              <a:rPr sz="2104" spc="-10">
-                <a:latin typeface="Calibri"/>
-                <a:cs typeface="Calibri"/>
-              </a:rPr>
-              <a:t>examples, </a:t>
-            </a:r>
-            <a:r>
-              <a:rPr sz="2104">
-                <a:latin typeface="Calibri"/>
-                <a:cs typeface="Calibri"/>
-              </a:rPr>
-              <a:t>the model, </a:t>
-            </a:r>
-            <a:r>
-              <a:rPr sz="2104" spc="-5">
-                <a:latin typeface="Calibri"/>
-                <a:cs typeface="Calibri"/>
-              </a:rPr>
-              <a:t>the algorithm</a:t>
-            </a:r>
-            <a:endParaRPr sz="2104">
-              <a:latin typeface="Calibri"/>
-              <a:cs typeface="Calibri"/>
-            </a:endParaRPr>
-          </a:p>
-        </p:txBody>
-      </p:sp>
-      <p:sp>
-        <p:nvSpPr>
-          <p:cNvPr id="5" name="object 5"/>
           <p:cNvSpPr/>
           <p:nvPr/>
         </p:nvSpPr>
         <p:spPr>
           <a:xfrm>
-            <a:off x="3871662" y="1612325"/>
-            <a:ext cx="5131649" cy="2458183"/>
+            <a:off x="3922047" y="1783328"/>
+            <a:ext cx="5267537" cy="2303975"/>
           </a:xfrm>
           <a:prstGeom prst="rect">
             <a:avLst/>
@@ -12650,10 +13001,129 @@
       </p:sp>
       <p:sp>
         <p:nvSpPr>
-          <p:cNvPr id="8" name="Title 1">
+          <p:cNvPr id="5" name="object 5"/>
+          <p:cNvSpPr txBox="1"/>
+          <p:nvPr/>
+        </p:nvSpPr>
+        <p:spPr>
+          <a:xfrm>
+            <a:off x="2230736" y="5488416"/>
+            <a:ext cx="3384456" cy="346080"/>
+          </a:xfrm>
+          <a:prstGeom prst="rect">
+            <a:avLst/>
+          </a:prstGeom>
+        </p:spPr>
+        <p:txBody>
+          <a:bodyPr vert="horz" wrap="square" lIns="0" tIns="12724" rIns="0" bIns="0" rtlCol="0">
+            <a:spAutoFit/>
+          </a:bodyPr>
+          <a:lstStyle/>
+          <a:p>
+            <a:pPr marL="185136" indent="-173048">
+              <a:spcBef>
+                <a:spcPts val="100"/>
+              </a:spcBef>
+              <a:buFont typeface="Arial"/>
+              <a:buChar char="•"/>
+              <a:tabLst>
+                <a:tab pos="185772" algn="l"/>
+              </a:tabLst>
+            </a:pPr>
+            <a:r>
+              <a:rPr sz="2104" spc="-30">
+                <a:latin typeface="Calibri"/>
+                <a:cs typeface="Calibri"/>
+              </a:rPr>
+              <a:t>Vary </a:t>
+            </a:r>
+            <a:r>
+              <a:rPr sz="2104" spc="-5">
+                <a:latin typeface="Calibri"/>
+                <a:cs typeface="Calibri"/>
+              </a:rPr>
+              <a:t>the number of</a:t>
+            </a:r>
+            <a:r>
+              <a:rPr sz="2104" spc="-45">
+                <a:latin typeface="Calibri"/>
+                <a:cs typeface="Calibri"/>
+              </a:rPr>
+              <a:t> </a:t>
+            </a:r>
+            <a:r>
+              <a:rPr sz="2104" spc="-10">
+                <a:latin typeface="Calibri"/>
+                <a:cs typeface="Calibri"/>
+              </a:rPr>
+              <a:t>examples</a:t>
+            </a:r>
+            <a:endParaRPr sz="2104">
+              <a:latin typeface="Calibri"/>
+              <a:cs typeface="Calibri"/>
+            </a:endParaRPr>
+          </a:p>
+        </p:txBody>
+      </p:sp>
+      <p:sp>
+        <p:nvSpPr>
+          <p:cNvPr id="6" name="object 2">
             <a:extLst>
               <a:ext uri="{FF2B5EF4-FFF2-40B4-BE49-F238E27FC236}">
-                <a16:creationId xmlns:a16="http://schemas.microsoft.com/office/drawing/2014/main" id="{C486B2C2-A4DF-48B1-9407-3E5764946F0D}"/>
+                <a16:creationId xmlns:a16="http://schemas.microsoft.com/office/drawing/2014/main" id="{EBEB8BB8-8870-4311-9F04-8F9514659CC8}"/>
+              </a:ext>
+            </a:extLst>
+          </p:cNvPr>
+          <p:cNvSpPr txBox="1"/>
+          <p:nvPr/>
+        </p:nvSpPr>
+        <p:spPr>
+          <a:xfrm>
+            <a:off x="6254750" y="4943558"/>
+            <a:ext cx="6705600" cy="259686"/>
+          </a:xfrm>
+          <a:prstGeom prst="rect">
+            <a:avLst/>
+          </a:prstGeom>
+        </p:spPr>
+        <p:txBody>
+          <a:bodyPr vert="horz" wrap="square" lIns="0" tIns="13335" rIns="0" bIns="0" rtlCol="0">
+            <a:spAutoFit/>
+          </a:bodyPr>
+          <a:lstStyle/>
+          <a:p>
+            <a:pPr>
+              <a:lnSpc>
+                <a:spcPct val="100000"/>
+              </a:lnSpc>
+              <a:spcBef>
+                <a:spcPts val="55"/>
+              </a:spcBef>
+            </a:pPr>
+            <a:r>
+              <a:rPr lang="en-US" sz="1600" b="0" i="0">
+                <a:solidFill>
+                  <a:srgbClr val="202124"/>
+                </a:solidFill>
+                <a:effectLst/>
+                <a:latin typeface="arial" panose="020B0604020202020204" pitchFamily="34" charset="0"/>
+              </a:rPr>
+              <a:t>Pushing optimization further, not changing n or </a:t>
+            </a:r>
+            <a:r>
+              <a:rPr lang="en-US" sz="1600"/>
+              <a:t>ℱ</a:t>
+            </a:r>
+            <a:endParaRPr lang="fr-FR" sz="1600"/>
+          </a:p>
+        </p:txBody>
+      </p:sp>
+      <p:sp>
+        <p:nvSpPr>
+          <p:cNvPr id="9" name="Title 1">
+            <a:extLst>
+              <a:ext uri="{FF2B5EF4-FFF2-40B4-BE49-F238E27FC236}">
+                <a16:creationId xmlns:a16="http://schemas.microsoft.com/office/drawing/2014/main" id="{92C66DE4-9D3B-42EA-B2EE-C6EDAFA2C2DA}"/>
               </a:ext>
             </a:extLst>
           </p:cNvPr>
@@ -12772,6 +13242,223 @@
         <p:spPr>
           <a:xfrm>
             <a:off x="2230736" y="5488416"/>
+            <a:ext cx="6226254" cy="346080"/>
+          </a:xfrm>
+          <a:prstGeom prst="rect">
+            <a:avLst/>
+          </a:prstGeom>
+        </p:spPr>
+        <p:txBody>
+          <a:bodyPr vert="horz" wrap="square" lIns="0" tIns="12724" rIns="0" bIns="0" rtlCol="0">
+            <a:spAutoFit/>
+          </a:bodyPr>
+          <a:lstStyle/>
+          <a:p>
+            <a:pPr marL="185136" indent="-173048">
+              <a:spcBef>
+                <a:spcPts val="100"/>
+              </a:spcBef>
+              <a:buFont typeface="Arial"/>
+              <a:buChar char="•"/>
+              <a:tabLst>
+                <a:tab pos="185772" algn="l"/>
+              </a:tabLst>
+            </a:pPr>
+            <a:r>
+              <a:rPr sz="2104" spc="-30">
+                <a:latin typeface="Calibri"/>
+                <a:cs typeface="Calibri"/>
+              </a:rPr>
+              <a:t>Vary </a:t>
+            </a:r>
+            <a:r>
+              <a:rPr sz="2104" spc="-5">
+                <a:latin typeface="Calibri"/>
+                <a:cs typeface="Calibri"/>
+              </a:rPr>
+              <a:t>the number of </a:t>
+            </a:r>
+            <a:r>
+              <a:rPr sz="2104" spc="-10">
+                <a:latin typeface="Calibri"/>
+                <a:cs typeface="Calibri"/>
+              </a:rPr>
+              <a:t>examples, </a:t>
+            </a:r>
+            <a:r>
+              <a:rPr sz="2104">
+                <a:latin typeface="Calibri"/>
+                <a:cs typeface="Calibri"/>
+              </a:rPr>
+              <a:t>the model, </a:t>
+            </a:r>
+            <a:r>
+              <a:rPr sz="2104" spc="-5">
+                <a:latin typeface="Calibri"/>
+                <a:cs typeface="Calibri"/>
+              </a:rPr>
+              <a:t>the algorithm</a:t>
+            </a:r>
+            <a:endParaRPr sz="2104">
+              <a:latin typeface="Calibri"/>
+              <a:cs typeface="Calibri"/>
+            </a:endParaRPr>
+          </a:p>
+        </p:txBody>
+      </p:sp>
+      <p:sp>
+        <p:nvSpPr>
+          <p:cNvPr id="5" name="object 5"/>
+          <p:cNvSpPr/>
+          <p:nvPr/>
+        </p:nvSpPr>
+        <p:spPr>
+          <a:xfrm>
+            <a:off x="3871662" y="1612325"/>
+            <a:ext cx="5131649" cy="2458183"/>
+          </a:xfrm>
+          <a:prstGeom prst="rect">
+            <a:avLst/>
+          </a:prstGeom>
+          <a:blipFill>
+            <a:blip r:embed="rId3" cstate="print"/>
+            <a:stretch>
+              <a:fillRect/>
+            </a:stretch>
+          </a:blipFill>
+        </p:spPr>
+        <p:txBody>
+          <a:bodyPr wrap="square" lIns="0" tIns="0" rIns="0" bIns="0" rtlCol="0"/>
+          <a:lstStyle/>
+          <a:p>
+            <a:endParaRPr sz="1803"/>
+          </a:p>
+        </p:txBody>
+      </p:sp>
+      <p:sp>
+        <p:nvSpPr>
+          <p:cNvPr id="8" name="Title 1">
+            <a:extLst>
+              <a:ext uri="{FF2B5EF4-FFF2-40B4-BE49-F238E27FC236}">
+                <a16:creationId xmlns:a16="http://schemas.microsoft.com/office/drawing/2014/main" id="{C486B2C2-A4DF-48B1-9407-3E5764946F0D}"/>
+              </a:ext>
+            </a:extLst>
+          </p:cNvPr>
+          <p:cNvSpPr txBox="1">
+            <a:spLocks/>
+          </p:cNvSpPr>
+          <p:nvPr/>
+        </p:nvSpPr>
+        <p:spPr>
+          <a:xfrm>
+            <a:off x="1678146" y="387350"/>
+            <a:ext cx="9529604" cy="1143000"/>
+          </a:xfrm>
+          <a:prstGeom prst="rect">
+            <a:avLst/>
+          </a:prstGeom>
+        </p:spPr>
+        <p:txBody>
+          <a:bodyPr/>
+          <a:lstStyle>
+            <a:lvl1pPr algn="l" defTabSz="914400" rtl="0" eaLnBrk="1" latinLnBrk="0" hangingPunct="1">
+              <a:lnSpc>
+                <a:spcPct val="90000"/>
+              </a:lnSpc>
+              <a:spcBef>
+                <a:spcPct val="0"/>
+              </a:spcBef>
+              <a:buNone/>
+              <a:defRPr sz="4400" kern="1200">
+                <a:solidFill>
+                  <a:schemeClr val="tx1"/>
+                </a:solidFill>
+                <a:latin typeface="+mj-lt"/>
+                <a:ea typeface="+mj-ea"/>
+                <a:cs typeface="+mj-cs"/>
+              </a:defRPr>
+            </a:lvl1pPr>
+          </a:lstStyle>
+          <a:p>
+            <a:r>
+              <a:rPr lang="en-US" sz="3600">
+                <a:latin typeface="Verdana" panose="020B0604030504040204" pitchFamily="34" charset="0"/>
+                <a:ea typeface="Verdana" panose="020B0604030504040204" pitchFamily="34" charset="0"/>
+              </a:rPr>
+              <a:t>Test error versus computing time</a:t>
+            </a:r>
+          </a:p>
+          <a:p>
+            <a:endParaRPr lang="en-US" sz="3600">
+              <a:latin typeface="Verdana" panose="020B0604030504040204" pitchFamily="34" charset="0"/>
+              <a:ea typeface="Verdana" panose="020B0604030504040204" pitchFamily="34" charset="0"/>
+            </a:endParaRPr>
+          </a:p>
+        </p:txBody>
+      </p:sp>
+    </p:spTree>
+  </p:cSld>
+  <p:clrMapOvr>
+    <a:masterClrMapping/>
+  </p:clrMapOvr>
+</p:sld>
+</file>
+
+<file path=ppt/slides/slide24.xml><?xml version="1.0" encoding="utf-8"?>
+<p:sld xmlns:a="http://schemas.openxmlformats.org/drawingml/2006/main" xmlns:r="http://schemas.openxmlformats.org/officeDocument/2006/relationships" xmlns:p="http://schemas.openxmlformats.org/presentationml/2006/main">
+  <p:cSld>
+    <p:spTree>
+      <p:nvGrpSpPr>
+        <p:cNvPr id="1" name=""/>
+        <p:cNvGrpSpPr/>
+        <p:nvPr/>
+      </p:nvGrpSpPr>
+      <p:grpSpPr>
+        <a:xfrm>
+          <a:off x="0" y="0"/>
+          <a:ext cx="0" cy="0"/>
+          <a:chOff x="0" y="0"/>
+          <a:chExt cx="0" cy="0"/>
+        </a:xfrm>
+      </p:grpSpPr>
+      <p:sp>
+        <p:nvSpPr>
+          <p:cNvPr id="3" name="object 3"/>
+          <p:cNvSpPr/>
+          <p:nvPr/>
+        </p:nvSpPr>
+        <p:spPr>
+          <a:xfrm>
+            <a:off x="3561281" y="1927571"/>
+            <a:ext cx="4869222" cy="3001587"/>
+          </a:xfrm>
+          <a:prstGeom prst="rect">
+            <a:avLst/>
+          </a:prstGeom>
+          <a:blipFill>
+            <a:blip r:embed="rId2" cstate="print"/>
+            <a:stretch>
+              <a:fillRect/>
+            </a:stretch>
+          </a:blipFill>
+        </p:spPr>
+        <p:txBody>
+          <a:bodyPr wrap="square" lIns="0" tIns="0" rIns="0" bIns="0" rtlCol="0"/>
+          <a:lstStyle/>
+          <a:p>
+            <a:endParaRPr sz="1803"/>
+          </a:p>
+        </p:txBody>
+      </p:sp>
+      <p:sp>
+        <p:nvSpPr>
+          <p:cNvPr id="4" name="object 4"/>
+          <p:cNvSpPr txBox="1"/>
+          <p:nvPr/>
+        </p:nvSpPr>
+        <p:spPr>
+          <a:xfrm>
+            <a:off x="2230736" y="5488416"/>
             <a:ext cx="6170906" cy="346080"/>
           </a:xfrm>
           <a:prstGeom prst="rect">
@@ -13169,7 +13856,7 @@
 </p:sld>
 </file>
 
-<file path=ppt/slides/slide24.xml><?xml version="1.0" encoding="utf-8"?>
+<file path=ppt/slides/slide25.xml><?xml version="1.0" encoding="utf-8"?>
 <p:sld xmlns:a="http://schemas.openxmlformats.org/drawingml/2006/main" xmlns:r="http://schemas.openxmlformats.org/officeDocument/2006/relationships" xmlns:p="http://schemas.openxmlformats.org/presentationml/2006/main">
   <p:cSld>
     <p:spTree>
@@ -13793,7 +14480,7 @@
 </p:sld>
 </file>
 
-<file path=ppt/slides/slide25.xml><?xml version="1.0" encoding="utf-8"?>
+<file path=ppt/slides/slide26.xml><?xml version="1.0" encoding="utf-8"?>
 <p:sld xmlns:a="http://schemas.openxmlformats.org/drawingml/2006/main" xmlns:r="http://schemas.openxmlformats.org/officeDocument/2006/relationships" xmlns:p="http://schemas.openxmlformats.org/presentationml/2006/main" showMasterSp="0">
   <p:cSld>
     <p:spTree>
@@ -13928,7 +14615,7 @@
 </p:sld>
 </file>
 
-<file path=ppt/slides/slide26.xml><?xml version="1.0" encoding="utf-8"?>
+<file path=ppt/slides/slide27.xml><?xml version="1.0" encoding="utf-8"?>
 <p:sld xmlns:a="http://schemas.openxmlformats.org/drawingml/2006/main" xmlns:r="http://schemas.openxmlformats.org/officeDocument/2006/relationships" xmlns:p="http://schemas.openxmlformats.org/presentationml/2006/main">
   <p:cSld>
     <p:spTree>
@@ -15462,7 +16149,7 @@
 </p:sld>
 </file>
 
-<file path=ppt/slides/slide27.xml><?xml version="1.0" encoding="utf-8"?>
+<file path=ppt/slides/slide28.xml><?xml version="1.0" encoding="utf-8"?>
 <p:sld xmlns:a="http://schemas.openxmlformats.org/drawingml/2006/main" xmlns:r="http://schemas.openxmlformats.org/officeDocument/2006/relationships" xmlns:p="http://schemas.openxmlformats.org/presentationml/2006/main">
   <p:cSld>
     <p:spTree>
@@ -16155,7 +16842,7 @@
 </p:sld>
 </file>
 
-<file path=ppt/slides/slide28.xml><?xml version="1.0" encoding="utf-8"?>
+<file path=ppt/slides/slide29.xml><?xml version="1.0" encoding="utf-8"?>
 <p:sld xmlns:a="http://schemas.openxmlformats.org/drawingml/2006/main" xmlns:r="http://schemas.openxmlformats.org/officeDocument/2006/relationships" xmlns:p="http://schemas.openxmlformats.org/presentationml/2006/main">
   <p:cSld>
     <p:spTree>
@@ -17267,7 +17954,416 @@
 </p:sld>
 </file>
 
-<file path=ppt/slides/slide29.xml><?xml version="1.0" encoding="utf-8"?>
+<file path=ppt/slides/slide3.xml><?xml version="1.0" encoding="utf-8"?>
+<p:sld xmlns:a="http://schemas.openxmlformats.org/drawingml/2006/main" xmlns:r="http://schemas.openxmlformats.org/officeDocument/2006/relationships" xmlns:p="http://schemas.openxmlformats.org/presentationml/2006/main">
+  <p:cSld>
+    <p:spTree>
+      <p:nvGrpSpPr>
+        <p:cNvPr id="1" name=""/>
+        <p:cNvGrpSpPr/>
+        <p:nvPr/>
+      </p:nvGrpSpPr>
+      <p:grpSpPr>
+        <a:xfrm>
+          <a:off x="0" y="0"/>
+          <a:ext cx="0" cy="0"/>
+          <a:chOff x="0" y="0"/>
+          <a:chExt cx="0" cy="0"/>
+        </a:xfrm>
+      </p:grpSpPr>
+      <p:sp>
+        <p:nvSpPr>
+          <p:cNvPr id="2" name="object 2"/>
+          <p:cNvSpPr txBox="1"/>
+          <p:nvPr/>
+        </p:nvSpPr>
+        <p:spPr>
+          <a:xfrm>
+            <a:off x="704850" y="1310639"/>
+            <a:ext cx="11264900" cy="567463"/>
+          </a:xfrm>
+          <a:prstGeom prst="rect">
+            <a:avLst/>
+          </a:prstGeom>
+        </p:spPr>
+        <p:txBody>
+          <a:bodyPr vert="horz" wrap="square" lIns="0" tIns="13335" rIns="0" bIns="0" rtlCol="0">
+            <a:spAutoFit/>
+          </a:bodyPr>
+          <a:lstStyle/>
+          <a:p>
+            <a:pPr marL="12700">
+              <a:lnSpc>
+                <a:spcPct val="100000"/>
+              </a:lnSpc>
+              <a:spcBef>
+                <a:spcPts val="105"/>
+              </a:spcBef>
+            </a:pPr>
+            <a:r>
+              <a:rPr lang="fr-FR" sz="3600" b="1" spc="-15" dirty="0" err="1">
+                <a:latin typeface="Verdana"/>
+                <a:cs typeface="Verdana"/>
+              </a:rPr>
+              <a:t>Teachers</a:t>
+            </a:r>
+            <a:endParaRPr sz="3600" dirty="0">
+              <a:latin typeface="Verdana"/>
+              <a:cs typeface="Verdana"/>
+            </a:endParaRPr>
+          </a:p>
+        </p:txBody>
+      </p:sp>
+      <p:pic>
+        <p:nvPicPr>
+          <p:cNvPr id="6" name="Image 5" descr="Une image contenant homme, personne, mur, intérieur&#10;&#10;Description générée automatiquement">
+            <a:extLst>
+              <a:ext uri="{FF2B5EF4-FFF2-40B4-BE49-F238E27FC236}">
+                <a16:creationId xmlns:a16="http://schemas.microsoft.com/office/drawing/2014/main" id="{5E1FEC67-AF89-4982-9437-FA390231404E}"/>
+              </a:ext>
+            </a:extLst>
+          </p:cNvPr>
+          <p:cNvPicPr>
+            <a:picLocks noChangeAspect="1"/>
+          </p:cNvPicPr>
+          <p:nvPr/>
+        </p:nvPicPr>
+        <p:blipFill>
+          <a:blip r:embed="rId2" cstate="print">
+            <a:extLst>
+              <a:ext uri="{28A0092B-C50C-407E-A947-70E740481C1C}">
+                <a14:useLocalDpi xmlns:a14="http://schemas.microsoft.com/office/drawing/2010/main" val="0"/>
+              </a:ext>
+            </a:extLst>
+          </a:blip>
+          <a:stretch>
+            <a:fillRect/>
+          </a:stretch>
+        </p:blipFill>
+        <p:spPr>
+          <a:xfrm>
+            <a:off x="6508384" y="2752378"/>
+            <a:ext cx="2003037" cy="2003037"/>
+          </a:xfrm>
+          <a:prstGeom prst="rect">
+            <a:avLst/>
+          </a:prstGeom>
+        </p:spPr>
+      </p:pic>
+      <p:pic>
+        <p:nvPicPr>
+          <p:cNvPr id="11" name="Image 10">
+            <a:extLst>
+              <a:ext uri="{FF2B5EF4-FFF2-40B4-BE49-F238E27FC236}">
+                <a16:creationId xmlns:a16="http://schemas.microsoft.com/office/drawing/2014/main" id="{CEA9018F-5CBB-421A-A0D0-48FB6383ABE6}"/>
+              </a:ext>
+            </a:extLst>
+          </p:cNvPr>
+          <p:cNvPicPr>
+            <a:picLocks noChangeAspect="1"/>
+          </p:cNvPicPr>
+          <p:nvPr/>
+        </p:nvPicPr>
+        <p:blipFill>
+          <a:blip r:embed="rId3"/>
+          <a:stretch>
+            <a:fillRect/>
+          </a:stretch>
+        </p:blipFill>
+        <p:spPr>
+          <a:xfrm>
+            <a:off x="9210287" y="2752378"/>
+            <a:ext cx="1906950" cy="2003037"/>
+          </a:xfrm>
+          <a:prstGeom prst="rect">
+            <a:avLst/>
+          </a:prstGeom>
+        </p:spPr>
+      </p:pic>
+      <p:pic>
+        <p:nvPicPr>
+          <p:cNvPr id="13" name="Image 12" descr="Une image contenant personne, intérieur, verres, souriant&#10;&#10;Description générée automatiquement">
+            <a:extLst>
+              <a:ext uri="{FF2B5EF4-FFF2-40B4-BE49-F238E27FC236}">
+                <a16:creationId xmlns:a16="http://schemas.microsoft.com/office/drawing/2014/main" id="{D70C9709-3E14-49AD-BBFE-426E54277306}"/>
+              </a:ext>
+            </a:extLst>
+          </p:cNvPr>
+          <p:cNvPicPr>
+            <a:picLocks noChangeAspect="1"/>
+          </p:cNvPicPr>
+          <p:nvPr/>
+        </p:nvPicPr>
+        <p:blipFill>
+          <a:blip r:embed="rId4" cstate="print">
+            <a:extLst>
+              <a:ext uri="{28A0092B-C50C-407E-A947-70E740481C1C}">
+                <a14:useLocalDpi xmlns:a14="http://schemas.microsoft.com/office/drawing/2010/main" val="0"/>
+              </a:ext>
+            </a:extLst>
+          </a:blip>
+          <a:stretch>
+            <a:fillRect/>
+          </a:stretch>
+        </p:blipFill>
+        <p:spPr>
+          <a:xfrm>
+            <a:off x="1104578" y="2752377"/>
+            <a:ext cx="2003037" cy="2003037"/>
+          </a:xfrm>
+          <a:prstGeom prst="rect">
+            <a:avLst/>
+          </a:prstGeom>
+        </p:spPr>
+      </p:pic>
+      <p:sp>
+        <p:nvSpPr>
+          <p:cNvPr id="14" name="ZoneTexte 13">
+            <a:extLst>
+              <a:ext uri="{FF2B5EF4-FFF2-40B4-BE49-F238E27FC236}">
+                <a16:creationId xmlns:a16="http://schemas.microsoft.com/office/drawing/2014/main" id="{B300DC74-B635-47C1-A8B5-237920D10E0C}"/>
+              </a:ext>
+            </a:extLst>
+          </p:cNvPr>
+          <p:cNvSpPr txBox="1"/>
+          <p:nvPr/>
+        </p:nvSpPr>
+        <p:spPr>
+          <a:xfrm>
+            <a:off x="1104578" y="4962719"/>
+            <a:ext cx="2003037" cy="800219"/>
+          </a:xfrm>
+          <a:prstGeom prst="rect">
+            <a:avLst/>
+          </a:prstGeom>
+          <a:noFill/>
+        </p:spPr>
+        <p:txBody>
+          <a:bodyPr wrap="square" rtlCol="0">
+            <a:spAutoFit/>
+          </a:bodyPr>
+          <a:lstStyle/>
+          <a:p>
+            <a:r>
+              <a:rPr lang="fr-FR" b="1" dirty="0"/>
+              <a:t>David Diebold</a:t>
+            </a:r>
+          </a:p>
+          <a:p>
+            <a:r>
+              <a:rPr lang="fr-FR" sz="1000" i="1" dirty="0"/>
+              <a:t>Software </a:t>
+            </a:r>
+            <a:r>
+              <a:rPr lang="fr-FR" sz="1000" i="1" dirty="0" err="1"/>
+              <a:t>Development</a:t>
+            </a:r>
+            <a:r>
+              <a:rPr lang="fr-FR" sz="1000" i="1" dirty="0"/>
+              <a:t> </a:t>
+            </a:r>
+            <a:r>
+              <a:rPr lang="fr-FR" sz="1000" i="1" dirty="0" err="1"/>
+              <a:t>Engineer</a:t>
+            </a:r>
+            <a:endParaRPr lang="fr-FR" sz="1000" i="1" dirty="0"/>
+          </a:p>
+          <a:p>
+            <a:endParaRPr lang="fr-FR" dirty="0"/>
+          </a:p>
+        </p:txBody>
+      </p:sp>
+      <p:sp>
+        <p:nvSpPr>
+          <p:cNvPr id="15" name="ZoneTexte 14">
+            <a:extLst>
+              <a:ext uri="{FF2B5EF4-FFF2-40B4-BE49-F238E27FC236}">
+                <a16:creationId xmlns:a16="http://schemas.microsoft.com/office/drawing/2014/main" id="{F0870409-7BFB-419E-9559-F38A09771026}"/>
+              </a:ext>
+            </a:extLst>
+          </p:cNvPr>
+          <p:cNvSpPr txBox="1"/>
+          <p:nvPr/>
+        </p:nvSpPr>
+        <p:spPr>
+          <a:xfrm>
+            <a:off x="3806481" y="4962719"/>
+            <a:ext cx="2003037" cy="800219"/>
+          </a:xfrm>
+          <a:prstGeom prst="rect">
+            <a:avLst/>
+          </a:prstGeom>
+          <a:noFill/>
+        </p:spPr>
+        <p:txBody>
+          <a:bodyPr wrap="square" rtlCol="0">
+            <a:spAutoFit/>
+          </a:bodyPr>
+          <a:lstStyle/>
+          <a:p>
+            <a:r>
+              <a:rPr lang="fr-FR" b="1" dirty="0"/>
+              <a:t>Etienne Duchesne</a:t>
+            </a:r>
+          </a:p>
+          <a:p>
+            <a:r>
+              <a:rPr lang="fr-FR" sz="1000" i="1" dirty="0"/>
+              <a:t>PHD, Machine Learning </a:t>
+            </a:r>
+            <a:r>
+              <a:rPr lang="fr-FR" sz="1000" i="1" dirty="0" err="1"/>
+              <a:t>Engineer</a:t>
+            </a:r>
+            <a:endParaRPr lang="fr-FR" sz="1000" i="1" dirty="0"/>
+          </a:p>
+          <a:p>
+            <a:endParaRPr lang="fr-FR" dirty="0"/>
+          </a:p>
+        </p:txBody>
+      </p:sp>
+      <p:sp>
+        <p:nvSpPr>
+          <p:cNvPr id="16" name="ZoneTexte 15">
+            <a:extLst>
+              <a:ext uri="{FF2B5EF4-FFF2-40B4-BE49-F238E27FC236}">
+                <a16:creationId xmlns:a16="http://schemas.microsoft.com/office/drawing/2014/main" id="{E669C8A1-597F-40E6-B587-8D23A4D8E14D}"/>
+              </a:ext>
+            </a:extLst>
+          </p:cNvPr>
+          <p:cNvSpPr txBox="1"/>
+          <p:nvPr/>
+        </p:nvSpPr>
+        <p:spPr>
+          <a:xfrm>
+            <a:off x="6508383" y="4962719"/>
+            <a:ext cx="2003037" cy="800219"/>
+          </a:xfrm>
+          <a:prstGeom prst="rect">
+            <a:avLst/>
+          </a:prstGeom>
+          <a:noFill/>
+        </p:spPr>
+        <p:txBody>
+          <a:bodyPr wrap="square" rtlCol="0">
+            <a:spAutoFit/>
+          </a:bodyPr>
+          <a:lstStyle/>
+          <a:p>
+            <a:r>
+              <a:rPr lang="fr-FR" b="1" dirty="0"/>
+              <a:t>Martin Bompaire</a:t>
+            </a:r>
+          </a:p>
+          <a:p>
+            <a:r>
+              <a:rPr lang="fr-FR" sz="1000" i="1" dirty="0"/>
+              <a:t>PHD, Machine Learning </a:t>
+            </a:r>
+            <a:r>
+              <a:rPr lang="fr-FR" sz="1000" i="1" dirty="0" err="1"/>
+              <a:t>Engineer</a:t>
+            </a:r>
+            <a:endParaRPr lang="fr-FR" sz="1000" i="1" dirty="0"/>
+          </a:p>
+          <a:p>
+            <a:endParaRPr lang="fr-FR" dirty="0"/>
+          </a:p>
+        </p:txBody>
+      </p:sp>
+      <p:sp>
+        <p:nvSpPr>
+          <p:cNvPr id="17" name="ZoneTexte 16">
+            <a:extLst>
+              <a:ext uri="{FF2B5EF4-FFF2-40B4-BE49-F238E27FC236}">
+                <a16:creationId xmlns:a16="http://schemas.microsoft.com/office/drawing/2014/main" id="{AE9E5A27-73E5-4C34-8BE9-FC63EB6BD6EF}"/>
+              </a:ext>
+            </a:extLst>
+          </p:cNvPr>
+          <p:cNvSpPr txBox="1"/>
+          <p:nvPr/>
+        </p:nvSpPr>
+        <p:spPr>
+          <a:xfrm>
+            <a:off x="9210285" y="4962719"/>
+            <a:ext cx="2003037" cy="800219"/>
+          </a:xfrm>
+          <a:prstGeom prst="rect">
+            <a:avLst/>
+          </a:prstGeom>
+          <a:noFill/>
+        </p:spPr>
+        <p:txBody>
+          <a:bodyPr wrap="square" rtlCol="0">
+            <a:spAutoFit/>
+          </a:bodyPr>
+          <a:lstStyle/>
+          <a:p>
+            <a:r>
+              <a:rPr lang="fr-FR" b="1" dirty="0"/>
+              <a:t>Alexandre Gilotte</a:t>
+            </a:r>
+          </a:p>
+          <a:p>
+            <a:r>
+              <a:rPr lang="fr-FR" sz="1000" i="1" dirty="0"/>
+              <a:t>PHD, </a:t>
+            </a:r>
+            <a:r>
+              <a:rPr lang="fr-FR" sz="1000" i="1" dirty="0" err="1"/>
+              <a:t>Researcher</a:t>
+            </a:r>
+            <a:endParaRPr lang="fr-FR" sz="1000" i="1" dirty="0"/>
+          </a:p>
+          <a:p>
+            <a:endParaRPr lang="fr-FR" dirty="0"/>
+          </a:p>
+        </p:txBody>
+      </p:sp>
+      <p:pic>
+        <p:nvPicPr>
+          <p:cNvPr id="18" name="Image 17">
+            <a:extLst>
+              <a:ext uri="{FF2B5EF4-FFF2-40B4-BE49-F238E27FC236}">
+                <a16:creationId xmlns:a16="http://schemas.microsoft.com/office/drawing/2014/main" id="{9F4D688E-38FA-44D9-BF44-61AC962B26DB}"/>
+              </a:ext>
+            </a:extLst>
+          </p:cNvPr>
+          <p:cNvPicPr>
+            <a:picLocks noChangeAspect="1"/>
+          </p:cNvPicPr>
+          <p:nvPr/>
+        </p:nvPicPr>
+        <p:blipFill>
+          <a:blip r:embed="rId5"/>
+          <a:stretch>
+            <a:fillRect/>
+          </a:stretch>
+        </p:blipFill>
+        <p:spPr>
+          <a:xfrm>
+            <a:off x="3797571" y="2752377"/>
+            <a:ext cx="2020856" cy="2020856"/>
+          </a:xfrm>
+          <a:prstGeom prst="rect">
+            <a:avLst/>
+          </a:prstGeom>
+        </p:spPr>
+      </p:pic>
+    </p:spTree>
+    <p:extLst>
+      <p:ext uri="{BB962C8B-B14F-4D97-AF65-F5344CB8AC3E}">
+        <p14:creationId xmlns:p14="http://schemas.microsoft.com/office/powerpoint/2010/main" val="901038463"/>
+      </p:ext>
+    </p:extLst>
+  </p:cSld>
+  <p:clrMapOvr>
+    <a:masterClrMapping/>
+  </p:clrMapOvr>
+</p:sld>
+</file>
+
+<file path=ppt/slides/slide30.xml><?xml version="1.0" encoding="utf-8"?>
 <p:sld xmlns:a="http://schemas.openxmlformats.org/drawingml/2006/main" xmlns:r="http://schemas.openxmlformats.org/officeDocument/2006/relationships" xmlns:p="http://schemas.openxmlformats.org/presentationml/2006/main">
   <p:cSld>
     <p:spTree>
@@ -17938,167 +19034,7 @@
 </p:sld>
 </file>
 
-<file path=ppt/slides/slide3.xml><?xml version="1.0" encoding="utf-8"?>
-<p:sld xmlns:a="http://schemas.openxmlformats.org/drawingml/2006/main" xmlns:r="http://schemas.openxmlformats.org/officeDocument/2006/relationships" xmlns:p="http://schemas.openxmlformats.org/presentationml/2006/main">
-  <p:cSld>
-    <p:spTree>
-      <p:nvGrpSpPr>
-        <p:cNvPr id="1" name=""/>
-        <p:cNvGrpSpPr/>
-        <p:nvPr/>
-      </p:nvGrpSpPr>
-      <p:grpSpPr>
-        <a:xfrm>
-          <a:off x="0" y="0"/>
-          <a:ext cx="0" cy="0"/>
-          <a:chOff x="0" y="0"/>
-          <a:chExt cx="0" cy="0"/>
-        </a:xfrm>
-      </p:grpSpPr>
-      <p:sp>
-        <p:nvSpPr>
-          <p:cNvPr id="2" name="Title 1">
-            <a:extLst>
-              <a:ext uri="{FF2B5EF4-FFF2-40B4-BE49-F238E27FC236}">
-                <a16:creationId xmlns:a16="http://schemas.microsoft.com/office/drawing/2014/main" id="{BB11055B-BF1B-48F0-AEE5-04D05225545F}"/>
-              </a:ext>
-            </a:extLst>
-          </p:cNvPr>
-          <p:cNvSpPr>
-            <a:spLocks noGrp="1"/>
-          </p:cNvSpPr>
-          <p:nvPr>
-            <p:ph type="title"/>
-          </p:nvPr>
-        </p:nvSpPr>
-        <p:spPr>
-          <a:xfrm>
-            <a:off x="615950" y="387350"/>
-            <a:ext cx="10372089" cy="738664"/>
-          </a:xfrm>
-        </p:spPr>
-        <p:txBody>
-          <a:bodyPr/>
-          <a:lstStyle/>
-          <a:p>
-            <a:r>
-              <a:rPr lang="en-US"/>
-              <a:t>Acknowledgement</a:t>
-            </a:r>
-          </a:p>
-        </p:txBody>
-      </p:sp>
-      <p:sp>
-        <p:nvSpPr>
-          <p:cNvPr id="3" name="Text Placeholder 2">
-            <a:extLst>
-              <a:ext uri="{FF2B5EF4-FFF2-40B4-BE49-F238E27FC236}">
-                <a16:creationId xmlns:a16="http://schemas.microsoft.com/office/drawing/2014/main" id="{DFB9DF1D-F96B-4DCB-A3FB-E0B1FF724D3C}"/>
-              </a:ext>
-            </a:extLst>
-          </p:cNvPr>
-          <p:cNvSpPr>
-            <a:spLocks noGrp="1"/>
-          </p:cNvSpPr>
-          <p:nvPr>
-            <p:ph type="body" idx="1"/>
-          </p:nvPr>
-        </p:nvSpPr>
-        <p:spPr>
-          <a:xfrm>
-            <a:off x="387350" y="2139950"/>
-            <a:ext cx="10296652" cy="4062651"/>
-          </a:xfrm>
-        </p:spPr>
-        <p:txBody>
-          <a:bodyPr/>
-          <a:lstStyle/>
-          <a:p>
-            <a:r>
-              <a:rPr lang="en-US"/>
-              <a:t>Those slides are largely inspired / copied from several sources:</a:t>
-            </a:r>
-          </a:p>
-          <a:p>
-            <a:endParaRPr lang="en-US"/>
-          </a:p>
-          <a:p>
-            <a:r>
-              <a:rPr lang="en-US"/>
-              <a:t>Léon </a:t>
-            </a:r>
-            <a:r>
-              <a:rPr lang="en-US" err="1"/>
-              <a:t>Bottou’s</a:t>
-            </a:r>
-            <a:r>
-              <a:rPr lang="en-US"/>
-              <a:t> ”Large-scale machine learning revisited” conference: </a:t>
-            </a:r>
-            <a:r>
-              <a:rPr lang="en-US" u="sng">
-                <a:solidFill>
-                  <a:schemeClr val="accent1">
-                    <a:lumMod val="75000"/>
-                  </a:schemeClr>
-                </a:solidFill>
-              </a:rPr>
-              <a:t>https://bigdata2013.sciencesconf.org/conference/bigdata2013/pages/bottou.pdf</a:t>
-            </a:r>
-          </a:p>
-          <a:p>
-            <a:endParaRPr lang="en-US"/>
-          </a:p>
-          <a:p>
-            <a:r>
-              <a:rPr lang="en-US"/>
-              <a:t>Sanjiv Kumar’s ”Large-scale machine learning” course: </a:t>
-            </a:r>
-            <a:r>
-              <a:rPr lang="en-US">
-                <a:hlinkClick r:id="rId2"/>
-              </a:rPr>
-              <a:t>http://www.sanjivk.com/EECS6898/lectures.html</a:t>
-            </a:r>
-            <a:endParaRPr lang="en-US"/>
-          </a:p>
-          <a:p>
-            <a:endParaRPr lang="en-US"/>
-          </a:p>
-          <a:p>
-            <a:r>
-              <a:rPr lang="en-US"/>
-              <a:t>Jean-Philippe Vert’s “Large-Scale Machine Learning” course:</a:t>
-            </a:r>
-          </a:p>
-          <a:p>
-            <a:r>
-              <a:rPr lang="en-US">
-                <a:hlinkClick r:id="rId3"/>
-              </a:rPr>
-              <a:t>http://members.cbio.mines-paristech.fr/~jvert/svn/lsml/lsml18/</a:t>
-            </a:r>
-            <a:endParaRPr lang="en-US"/>
-          </a:p>
-          <a:p>
-            <a:endParaRPr lang="en-US"/>
-          </a:p>
-        </p:txBody>
-      </p:sp>
-    </p:spTree>
-    <p:extLst>
-      <p:ext uri="{BB962C8B-B14F-4D97-AF65-F5344CB8AC3E}">
-        <p14:creationId xmlns:p14="http://schemas.microsoft.com/office/powerpoint/2010/main" val="136334414"/>
-      </p:ext>
-    </p:extLst>
-  </p:cSld>
-  <p:clrMapOvr>
-    <a:masterClrMapping/>
-  </p:clrMapOvr>
-</p:sld>
-</file>
-
-<file path=ppt/slides/slide30.xml><?xml version="1.0" encoding="utf-8"?>
+<file path=ppt/slides/slide31.xml><?xml version="1.0" encoding="utf-8"?>
 <p:sld xmlns:a="http://schemas.openxmlformats.org/drawingml/2006/main" xmlns:r="http://schemas.openxmlformats.org/officeDocument/2006/relationships" xmlns:p="http://schemas.openxmlformats.org/presentationml/2006/main">
   <p:cSld>
     <p:spTree>
@@ -18588,7 +19524,7 @@
 </p:sld>
 </file>
 
-<file path=ppt/slides/slide31.xml><?xml version="1.0" encoding="utf-8"?>
+<file path=ppt/slides/slide32.xml><?xml version="1.0" encoding="utf-8"?>
 <p:sld xmlns:a="http://schemas.openxmlformats.org/drawingml/2006/main" xmlns:r="http://schemas.openxmlformats.org/officeDocument/2006/relationships" xmlns:p="http://schemas.openxmlformats.org/presentationml/2006/main">
   <p:cSld>
     <p:spTree>
@@ -19220,7 +20156,7 @@
 </p:sld>
 </file>
 
-<file path=ppt/slides/slide32.xml><?xml version="1.0" encoding="utf-8"?>
+<file path=ppt/slides/slide33.xml><?xml version="1.0" encoding="utf-8"?>
 <p:sld xmlns:a="http://schemas.openxmlformats.org/drawingml/2006/main" xmlns:r="http://schemas.openxmlformats.org/officeDocument/2006/relationships" xmlns:p="http://schemas.openxmlformats.org/presentationml/2006/main">
   <p:cSld>
     <p:spTree>
@@ -20643,7 +21579,7 @@
 </p:sld>
 </file>
 
-<file path=ppt/slides/slide33.xml><?xml version="1.0" encoding="utf-8"?>
+<file path=ppt/slides/slide34.xml><?xml version="1.0" encoding="utf-8"?>
 <p:sld xmlns:a="http://schemas.openxmlformats.org/drawingml/2006/main" xmlns:r="http://schemas.openxmlformats.org/officeDocument/2006/relationships" xmlns:p="http://schemas.openxmlformats.org/presentationml/2006/main">
   <p:cSld>
     <p:spTree>
@@ -20753,7 +21689,7 @@
 </p:sld>
 </file>
 
-<file path=ppt/slides/slide34.xml><?xml version="1.0" encoding="utf-8"?>
+<file path=ppt/slides/slide35.xml><?xml version="1.0" encoding="utf-8"?>
 <p:sld xmlns:a="http://schemas.openxmlformats.org/drawingml/2006/main" xmlns:r="http://schemas.openxmlformats.org/officeDocument/2006/relationships" xmlns:p="http://schemas.openxmlformats.org/presentationml/2006/main">
   <p:cSld>
     <p:spTree>
@@ -21589,7 +22525,7 @@
 </p:sld>
 </file>
 
-<file path=ppt/slides/slide35.xml><?xml version="1.0" encoding="utf-8"?>
+<file path=ppt/slides/slide36.xml><?xml version="1.0" encoding="utf-8"?>
 <p:sld xmlns:a="http://schemas.openxmlformats.org/drawingml/2006/main" xmlns:r="http://schemas.openxmlformats.org/officeDocument/2006/relationships" xmlns:p="http://schemas.openxmlformats.org/presentationml/2006/main">
   <p:cSld>
     <p:spTree>
@@ -22174,7 +23110,7 @@
 </p:sld>
 </file>
 
-<file path=ppt/slides/slide36.xml><?xml version="1.0" encoding="utf-8"?>
+<file path=ppt/slides/slide37.xml><?xml version="1.0" encoding="utf-8"?>
 <p:sld xmlns:a="http://schemas.openxmlformats.org/drawingml/2006/main" xmlns:r="http://schemas.openxmlformats.org/officeDocument/2006/relationships" xmlns:p="http://schemas.openxmlformats.org/presentationml/2006/main">
   <p:cSld>
     <p:spTree>
@@ -22294,7 +23230,7 @@
 </p:sld>
 </file>
 
-<file path=ppt/slides/slide37.xml><?xml version="1.0" encoding="utf-8"?>
+<file path=ppt/slides/slide38.xml><?xml version="1.0" encoding="utf-8"?>
 <p:sld xmlns:a="http://schemas.openxmlformats.org/drawingml/2006/main" xmlns:r="http://schemas.openxmlformats.org/officeDocument/2006/relationships" xmlns:p="http://schemas.openxmlformats.org/presentationml/2006/main">
   <p:cSld>
     <p:spTree>
@@ -23025,6 +23961,166 @@
 </file>
 
 <file path=ppt/slides/slide4.xml><?xml version="1.0" encoding="utf-8"?>
+<p:sld xmlns:a="http://schemas.openxmlformats.org/drawingml/2006/main" xmlns:r="http://schemas.openxmlformats.org/officeDocument/2006/relationships" xmlns:p="http://schemas.openxmlformats.org/presentationml/2006/main">
+  <p:cSld>
+    <p:spTree>
+      <p:nvGrpSpPr>
+        <p:cNvPr id="1" name=""/>
+        <p:cNvGrpSpPr/>
+        <p:nvPr/>
+      </p:nvGrpSpPr>
+      <p:grpSpPr>
+        <a:xfrm>
+          <a:off x="0" y="0"/>
+          <a:ext cx="0" cy="0"/>
+          <a:chOff x="0" y="0"/>
+          <a:chExt cx="0" cy="0"/>
+        </a:xfrm>
+      </p:grpSpPr>
+      <p:sp>
+        <p:nvSpPr>
+          <p:cNvPr id="2" name="Title 1">
+            <a:extLst>
+              <a:ext uri="{FF2B5EF4-FFF2-40B4-BE49-F238E27FC236}">
+                <a16:creationId xmlns:a16="http://schemas.microsoft.com/office/drawing/2014/main" id="{BB11055B-BF1B-48F0-AEE5-04D05225545F}"/>
+              </a:ext>
+            </a:extLst>
+          </p:cNvPr>
+          <p:cNvSpPr>
+            <a:spLocks noGrp="1"/>
+          </p:cNvSpPr>
+          <p:nvPr>
+            <p:ph type="title"/>
+          </p:nvPr>
+        </p:nvSpPr>
+        <p:spPr>
+          <a:xfrm>
+            <a:off x="615950" y="387350"/>
+            <a:ext cx="10372089" cy="738664"/>
+          </a:xfrm>
+        </p:spPr>
+        <p:txBody>
+          <a:bodyPr/>
+          <a:lstStyle/>
+          <a:p>
+            <a:r>
+              <a:rPr lang="en-US"/>
+              <a:t>Acknowledgement</a:t>
+            </a:r>
+          </a:p>
+        </p:txBody>
+      </p:sp>
+      <p:sp>
+        <p:nvSpPr>
+          <p:cNvPr id="3" name="Text Placeholder 2">
+            <a:extLst>
+              <a:ext uri="{FF2B5EF4-FFF2-40B4-BE49-F238E27FC236}">
+                <a16:creationId xmlns:a16="http://schemas.microsoft.com/office/drawing/2014/main" id="{DFB9DF1D-F96B-4DCB-A3FB-E0B1FF724D3C}"/>
+              </a:ext>
+            </a:extLst>
+          </p:cNvPr>
+          <p:cNvSpPr>
+            <a:spLocks noGrp="1"/>
+          </p:cNvSpPr>
+          <p:nvPr>
+            <p:ph type="body" idx="1"/>
+          </p:nvPr>
+        </p:nvSpPr>
+        <p:spPr>
+          <a:xfrm>
+            <a:off x="387350" y="2139950"/>
+            <a:ext cx="10296652" cy="4062651"/>
+          </a:xfrm>
+        </p:spPr>
+        <p:txBody>
+          <a:bodyPr/>
+          <a:lstStyle/>
+          <a:p>
+            <a:r>
+              <a:rPr lang="en-US"/>
+              <a:t>Those slides are largely inspired / copied from several sources:</a:t>
+            </a:r>
+          </a:p>
+          <a:p>
+            <a:endParaRPr lang="en-US"/>
+          </a:p>
+          <a:p>
+            <a:r>
+              <a:rPr lang="en-US"/>
+              <a:t>Léon </a:t>
+            </a:r>
+            <a:r>
+              <a:rPr lang="en-US" err="1"/>
+              <a:t>Bottou’s</a:t>
+            </a:r>
+            <a:r>
+              <a:rPr lang="en-US"/>
+              <a:t> ”Large-scale machine learning revisited” conference: </a:t>
+            </a:r>
+            <a:r>
+              <a:rPr lang="en-US" u="sng">
+                <a:solidFill>
+                  <a:schemeClr val="accent1">
+                    <a:lumMod val="75000"/>
+                  </a:schemeClr>
+                </a:solidFill>
+              </a:rPr>
+              <a:t>https://bigdata2013.sciencesconf.org/conference/bigdata2013/pages/bottou.pdf</a:t>
+            </a:r>
+          </a:p>
+          <a:p>
+            <a:endParaRPr lang="en-US"/>
+          </a:p>
+          <a:p>
+            <a:r>
+              <a:rPr lang="en-US"/>
+              <a:t>Sanjiv Kumar’s ”Large-scale machine learning” course: </a:t>
+            </a:r>
+            <a:r>
+              <a:rPr lang="en-US">
+                <a:hlinkClick r:id="rId2"/>
+              </a:rPr>
+              <a:t>http://www.sanjivk.com/EECS6898/lectures.html</a:t>
+            </a:r>
+            <a:endParaRPr lang="en-US"/>
+          </a:p>
+          <a:p>
+            <a:endParaRPr lang="en-US"/>
+          </a:p>
+          <a:p>
+            <a:r>
+              <a:rPr lang="en-US"/>
+              <a:t>Jean-Philippe Vert’s “Large-Scale Machine Learning” course:</a:t>
+            </a:r>
+          </a:p>
+          <a:p>
+            <a:r>
+              <a:rPr lang="en-US">
+                <a:hlinkClick r:id="rId3"/>
+              </a:rPr>
+              <a:t>http://members.cbio.mines-paristech.fr/~jvert/svn/lsml/lsml18/</a:t>
+            </a:r>
+            <a:endParaRPr lang="en-US"/>
+          </a:p>
+          <a:p>
+            <a:endParaRPr lang="en-US"/>
+          </a:p>
+        </p:txBody>
+      </p:sp>
+    </p:spTree>
+    <p:extLst>
+      <p:ext uri="{BB962C8B-B14F-4D97-AF65-F5344CB8AC3E}">
+        <p14:creationId xmlns:p14="http://schemas.microsoft.com/office/powerpoint/2010/main" val="136334414"/>
+      </p:ext>
+    </p:extLst>
+  </p:cSld>
+  <p:clrMapOvr>
+    <a:masterClrMapping/>
+  </p:clrMapOvr>
+</p:sld>
+</file>
+
+<file path=ppt/slides/slide5.xml><?xml version="1.0" encoding="utf-8"?>
 <p:sld xmlns:a="http://schemas.openxmlformats.org/drawingml/2006/main" xmlns:r="http://schemas.openxmlformats.org/officeDocument/2006/relationships" xmlns:p="http://schemas.openxmlformats.org/presentationml/2006/main" showMasterSp="0">
   <p:cSld>
     <p:spTree>
@@ -23360,7 +24456,7 @@
 </p:sld>
 </file>
 
-<file path=ppt/slides/slide5.xml><?xml version="1.0" encoding="utf-8"?>
+<file path=ppt/slides/slide6.xml><?xml version="1.0" encoding="utf-8"?>
 <p:sld xmlns:a="http://schemas.openxmlformats.org/drawingml/2006/main" xmlns:r="http://schemas.openxmlformats.org/officeDocument/2006/relationships" xmlns:p="http://schemas.openxmlformats.org/presentationml/2006/main">
   <p:cSld>
     <p:spTree>
@@ -23508,7 +24604,7 @@
 </p:sld>
 </file>
 
-<file path=ppt/slides/slide6.xml><?xml version="1.0" encoding="utf-8"?>
+<file path=ppt/slides/slide7.xml><?xml version="1.0" encoding="utf-8"?>
 <p:sld xmlns:a="http://schemas.openxmlformats.org/drawingml/2006/main" xmlns:r="http://schemas.openxmlformats.org/officeDocument/2006/relationships" xmlns:p="http://schemas.openxmlformats.org/presentationml/2006/main">
   <p:cSld>
     <p:spTree>
@@ -23678,7 +24774,7 @@
                   <a:spcPts val="676"/>
                 </a:lnSpc>
               </a:pPr>
-              <a:t>6</a:t>
+              <a:t>7</a:t>
             </a:fld>
             <a:r>
               <a:rPr lang="en-US" spc="-65"/>
@@ -23766,7 +24862,7 @@
 </p:sld>
 </file>
 
-<file path=ppt/slides/slide7.xml><?xml version="1.0" encoding="utf-8"?>
+<file path=ppt/slides/slide8.xml><?xml version="1.0" encoding="utf-8"?>
 <p:sld xmlns:a="http://schemas.openxmlformats.org/drawingml/2006/main" xmlns:r="http://schemas.openxmlformats.org/officeDocument/2006/relationships" xmlns:p="http://schemas.openxmlformats.org/presentationml/2006/main">
   <p:cSld>
     <p:spTree>
@@ -23936,7 +25032,7 @@
                   <a:spcPts val="676"/>
                 </a:lnSpc>
               </a:pPr>
-              <a:t>7</a:t>
+              <a:t>8</a:t>
             </a:fld>
             <a:r>
               <a:rPr lang="en-US" spc="-65"/>
@@ -24024,7 +25120,7 @@
 </p:sld>
 </file>
 
-<file path=ppt/slides/slide8.xml><?xml version="1.0" encoding="utf-8"?>
+<file path=ppt/slides/slide9.xml><?xml version="1.0" encoding="utf-8"?>
 <p:sld xmlns:a="http://schemas.openxmlformats.org/drawingml/2006/main" xmlns:r="http://schemas.openxmlformats.org/officeDocument/2006/relationships" xmlns:p="http://schemas.openxmlformats.org/presentationml/2006/main">
   <p:cSld>
     <p:spTree>
@@ -24147,692 +25243,6 @@
     <p:extLst>
       <p:ext uri="{BB962C8B-B14F-4D97-AF65-F5344CB8AC3E}">
         <p14:creationId xmlns:p14="http://schemas.microsoft.com/office/powerpoint/2010/main" val="3152478245"/>
-      </p:ext>
-    </p:extLst>
-  </p:cSld>
-  <p:clrMapOvr>
-    <a:masterClrMapping/>
-  </p:clrMapOvr>
-</p:sld>
-</file>
-
-<file path=ppt/slides/slide9.xml><?xml version="1.0" encoding="utf-8"?>
-<p:sld xmlns:a="http://schemas.openxmlformats.org/drawingml/2006/main" xmlns:r="http://schemas.openxmlformats.org/officeDocument/2006/relationships" xmlns:p="http://schemas.openxmlformats.org/presentationml/2006/main">
-  <p:cSld>
-    <p:spTree>
-      <p:nvGrpSpPr>
-        <p:cNvPr id="1" name=""/>
-        <p:cNvGrpSpPr/>
-        <p:nvPr/>
-      </p:nvGrpSpPr>
-      <p:grpSpPr>
-        <a:xfrm>
-          <a:off x="0" y="0"/>
-          <a:ext cx="0" cy="0"/>
-          <a:chOff x="0" y="0"/>
-          <a:chExt cx="0" cy="0"/>
-        </a:xfrm>
-      </p:grpSpPr>
-      <p:sp>
-        <p:nvSpPr>
-          <p:cNvPr id="2" name="object 2"/>
-          <p:cNvSpPr txBox="1"/>
-          <p:nvPr/>
-        </p:nvSpPr>
-        <p:spPr>
-          <a:xfrm>
-            <a:off x="692151" y="1622805"/>
-            <a:ext cx="9648824" cy="5130251"/>
-          </a:xfrm>
-          <a:prstGeom prst="rect">
-            <a:avLst/>
-          </a:prstGeom>
-        </p:spPr>
-        <p:txBody>
-          <a:bodyPr vert="horz" wrap="square" lIns="0" tIns="13335" rIns="0" bIns="0" rtlCol="0">
-            <a:spAutoFit/>
-          </a:bodyPr>
-          <a:lstStyle/>
-          <a:p>
-            <a:pPr marL="342900" indent="-342900">
-              <a:lnSpc>
-                <a:spcPct val="100000"/>
-              </a:lnSpc>
-              <a:spcBef>
-                <a:spcPts val="55"/>
-              </a:spcBef>
-              <a:buFont typeface="Arial" panose="020B0604020202020204" pitchFamily="34" charset="0"/>
-              <a:buChar char="•"/>
-            </a:pPr>
-            <a:r>
-              <a:rPr lang="fr-FR" sz="2000">
-                <a:latin typeface="Verdana"/>
-                <a:cs typeface="Verdana"/>
-              </a:rPr>
-              <a:t>Heavy computation</a:t>
-            </a:r>
-          </a:p>
-          <a:p>
-            <a:pPr lvl="1">
-              <a:spcBef>
-                <a:spcPts val="55"/>
-              </a:spcBef>
-            </a:pPr>
-            <a:r>
-              <a:rPr lang="fr-FR" sz="2000" err="1">
-                <a:solidFill>
-                  <a:srgbClr val="0070C0"/>
-                </a:solidFill>
-                <a:latin typeface="Verdana"/>
-                <a:cs typeface="Verdana"/>
-              </a:rPr>
-              <a:t>Parallelize</a:t>
-            </a:r>
-            <a:r>
-              <a:rPr lang="fr-FR" sz="2000">
-                <a:solidFill>
-                  <a:srgbClr val="0070C0"/>
-                </a:solidFill>
-                <a:latin typeface="Verdana"/>
-                <a:cs typeface="Verdana"/>
-              </a:rPr>
-              <a:t>, use </a:t>
-            </a:r>
-            <a:r>
-              <a:rPr lang="fr-FR" sz="2000" err="1">
-                <a:solidFill>
-                  <a:srgbClr val="0070C0"/>
-                </a:solidFill>
-                <a:latin typeface="Verdana"/>
-                <a:cs typeface="Verdana"/>
-              </a:rPr>
-              <a:t>specialised</a:t>
-            </a:r>
-            <a:r>
-              <a:rPr lang="fr-FR" sz="2000">
-                <a:solidFill>
-                  <a:srgbClr val="0070C0"/>
-                </a:solidFill>
-                <a:latin typeface="Verdana"/>
-                <a:cs typeface="Verdana"/>
-              </a:rPr>
-              <a:t> hardware</a:t>
-            </a:r>
-          </a:p>
-          <a:p>
-            <a:pPr marL="342900" indent="-342900">
-              <a:lnSpc>
-                <a:spcPct val="100000"/>
-              </a:lnSpc>
-              <a:spcBef>
-                <a:spcPts val="55"/>
-              </a:spcBef>
-              <a:buFont typeface="Arial" panose="020B0604020202020204" pitchFamily="34" charset="0"/>
-              <a:buChar char="•"/>
-            </a:pPr>
-            <a:endParaRPr lang="fr-FR" sz="2000">
-              <a:latin typeface="Verdana"/>
-              <a:cs typeface="Verdana"/>
-            </a:endParaRPr>
-          </a:p>
-          <a:p>
-            <a:pPr marL="342900" indent="-342900">
-              <a:lnSpc>
-                <a:spcPct val="100000"/>
-              </a:lnSpc>
-              <a:spcBef>
-                <a:spcPts val="55"/>
-              </a:spcBef>
-              <a:buFont typeface="Arial" panose="020B0604020202020204" pitchFamily="34" charset="0"/>
-              <a:buChar char="•"/>
-            </a:pPr>
-            <a:r>
-              <a:rPr lang="fr-FR" sz="2000" err="1">
-                <a:latin typeface="Verdana"/>
-                <a:cs typeface="Verdana"/>
-              </a:rPr>
-              <a:t>Dataset</a:t>
-            </a:r>
-            <a:r>
-              <a:rPr lang="fr-FR" sz="2000">
-                <a:latin typeface="Verdana"/>
-                <a:cs typeface="Verdana"/>
-              </a:rPr>
-              <a:t> </a:t>
-            </a:r>
-            <a:r>
-              <a:rPr lang="fr-FR" sz="2000" err="1">
-                <a:latin typeface="Verdana"/>
-                <a:cs typeface="Verdana"/>
-              </a:rPr>
-              <a:t>does</a:t>
-            </a:r>
-            <a:r>
-              <a:rPr lang="fr-FR" sz="2000">
-                <a:latin typeface="Verdana"/>
-                <a:cs typeface="Verdana"/>
-              </a:rPr>
-              <a:t> not fit in RAM</a:t>
-            </a:r>
-          </a:p>
-          <a:p>
-            <a:pPr lvl="1">
-              <a:spcBef>
-                <a:spcPts val="55"/>
-              </a:spcBef>
-            </a:pPr>
-            <a:r>
-              <a:rPr lang="fr-FR" sz="2000">
-                <a:solidFill>
-                  <a:srgbClr val="0070C0"/>
-                </a:solidFill>
-                <a:latin typeface="Verdana"/>
-                <a:cs typeface="Verdana"/>
-              </a:rPr>
-              <a:t>Streaming data</a:t>
-            </a:r>
-          </a:p>
-          <a:p>
-            <a:pPr lvl="1">
-              <a:spcBef>
-                <a:spcPts val="55"/>
-              </a:spcBef>
-            </a:pPr>
-            <a:endParaRPr lang="fr-FR" sz="2000">
-              <a:solidFill>
-                <a:srgbClr val="0070C0"/>
-              </a:solidFill>
-              <a:latin typeface="Verdana"/>
-              <a:cs typeface="Verdana"/>
-            </a:endParaRPr>
-          </a:p>
-          <a:p>
-            <a:pPr marL="342900" indent="-342900">
-              <a:lnSpc>
-                <a:spcPct val="100000"/>
-              </a:lnSpc>
-              <a:spcBef>
-                <a:spcPts val="55"/>
-              </a:spcBef>
-              <a:buFont typeface="Arial" panose="020B0604020202020204" pitchFamily="34" charset="0"/>
-              <a:buChar char="•"/>
-            </a:pPr>
-            <a:r>
-              <a:rPr lang="fr-FR" sz="2000">
-                <a:latin typeface="Verdana"/>
-                <a:cs typeface="Verdana"/>
-              </a:rPr>
-              <a:t>Polynomial </a:t>
-            </a:r>
-            <a:r>
-              <a:rPr lang="fr-FR" sz="2000" err="1">
-                <a:latin typeface="Verdana"/>
-                <a:cs typeface="Verdana"/>
-              </a:rPr>
-              <a:t>algorithms</a:t>
-            </a:r>
-            <a:r>
-              <a:rPr lang="fr-FR" sz="2000">
-                <a:latin typeface="Verdana"/>
-                <a:cs typeface="Verdana"/>
-              </a:rPr>
-              <a:t> are </a:t>
-            </a:r>
-            <a:r>
-              <a:rPr lang="fr-FR" sz="2000" err="1">
-                <a:latin typeface="Verdana"/>
-                <a:cs typeface="Verdana"/>
-              </a:rPr>
-              <a:t>too</a:t>
-            </a:r>
-            <a:r>
-              <a:rPr lang="fr-FR" sz="2000">
-                <a:latin typeface="Verdana"/>
-                <a:cs typeface="Verdana"/>
-              </a:rPr>
-              <a:t> </a:t>
-            </a:r>
-            <a:r>
-              <a:rPr lang="fr-FR" sz="2000" err="1">
-                <a:latin typeface="Verdana"/>
-                <a:cs typeface="Verdana"/>
-              </a:rPr>
-              <a:t>costly</a:t>
-            </a:r>
-            <a:r>
-              <a:rPr lang="fr-FR" sz="2000">
-                <a:latin typeface="Verdana"/>
-                <a:cs typeface="Verdana"/>
-              </a:rPr>
-              <a:t>: </a:t>
-            </a:r>
-          </a:p>
-          <a:p>
-            <a:pPr lvl="1">
-              <a:spcBef>
-                <a:spcPts val="55"/>
-              </a:spcBef>
-            </a:pPr>
-            <a:r>
-              <a:rPr lang="fr-FR" sz="2000" strike="sngStrike">
-                <a:latin typeface="Verdana"/>
-                <a:cs typeface="Verdana"/>
-              </a:rPr>
-              <a:t>O( n².d)</a:t>
-            </a:r>
-            <a:r>
-              <a:rPr lang="fr-FR" sz="2000">
-                <a:latin typeface="Verdana"/>
-                <a:cs typeface="Verdana"/>
-              </a:rPr>
-              <a:t>     </a:t>
-            </a:r>
-            <a:r>
-              <a:rPr lang="fr-FR" sz="2000" strike="sngStrike">
-                <a:latin typeface="Verdana"/>
-                <a:cs typeface="Verdana"/>
-              </a:rPr>
-              <a:t>O(n.d²)</a:t>
-            </a:r>
-          </a:p>
-          <a:p>
-            <a:pPr lvl="1">
-              <a:spcBef>
-                <a:spcPts val="55"/>
-              </a:spcBef>
-            </a:pPr>
-            <a:r>
-              <a:rPr lang="fr-FR" sz="2000">
-                <a:solidFill>
-                  <a:srgbClr val="0070C0"/>
-                </a:solidFill>
-                <a:latin typeface="Verdana"/>
-                <a:cs typeface="Verdana"/>
-              </a:rPr>
-              <a:t>Use </a:t>
-            </a:r>
-            <a:r>
-              <a:rPr lang="fr-FR" sz="2000" err="1">
-                <a:solidFill>
-                  <a:srgbClr val="0070C0"/>
-                </a:solidFill>
-                <a:latin typeface="Verdana"/>
-                <a:cs typeface="Verdana"/>
-              </a:rPr>
-              <a:t>linear</a:t>
-            </a:r>
-            <a:r>
-              <a:rPr lang="fr-FR" sz="2000">
-                <a:solidFill>
-                  <a:srgbClr val="0070C0"/>
-                </a:solidFill>
-                <a:latin typeface="Verdana"/>
-                <a:cs typeface="Verdana"/>
-              </a:rPr>
-              <a:t> </a:t>
-            </a:r>
-            <a:r>
-              <a:rPr lang="fr-FR" sz="2000" err="1">
-                <a:solidFill>
-                  <a:srgbClr val="0070C0"/>
-                </a:solidFill>
-                <a:latin typeface="Verdana"/>
-                <a:cs typeface="Verdana"/>
-              </a:rPr>
-              <a:t>algorithms</a:t>
-            </a:r>
-            <a:endParaRPr lang="fr-FR" sz="2000">
-              <a:solidFill>
-                <a:srgbClr val="0070C0"/>
-              </a:solidFill>
-              <a:latin typeface="Verdana"/>
-              <a:cs typeface="Verdana"/>
-            </a:endParaRPr>
-          </a:p>
-          <a:p>
-            <a:pPr>
-              <a:lnSpc>
-                <a:spcPct val="100000"/>
-              </a:lnSpc>
-              <a:spcBef>
-                <a:spcPts val="55"/>
-              </a:spcBef>
-            </a:pPr>
-            <a:endParaRPr lang="fr-FR" sz="2000">
-              <a:latin typeface="Verdana"/>
-              <a:cs typeface="Verdana"/>
-            </a:endParaRPr>
-          </a:p>
-          <a:p>
-            <a:pPr marL="342900" indent="-342900">
-              <a:lnSpc>
-                <a:spcPct val="100000"/>
-              </a:lnSpc>
-              <a:spcBef>
-                <a:spcPts val="55"/>
-              </a:spcBef>
-              <a:buFont typeface="Arial" panose="020B0604020202020204" pitchFamily="34" charset="0"/>
-              <a:buChar char="•"/>
-            </a:pPr>
-            <a:r>
-              <a:rPr lang="fr-FR" sz="2000" err="1">
-                <a:latin typeface="Verdana"/>
-                <a:cs typeface="Verdana"/>
-              </a:rPr>
-              <a:t>Collecting</a:t>
-            </a:r>
-            <a:r>
-              <a:rPr lang="fr-FR" sz="2000">
-                <a:latin typeface="Verdana"/>
-                <a:cs typeface="Verdana"/>
-              </a:rPr>
-              <a:t> </a:t>
-            </a:r>
-            <a:r>
-              <a:rPr lang="fr-FR" sz="2000" err="1">
-                <a:latin typeface="Verdana"/>
-                <a:cs typeface="Verdana"/>
-              </a:rPr>
-              <a:t>enough</a:t>
-            </a:r>
-            <a:r>
-              <a:rPr lang="fr-FR" sz="2000">
-                <a:latin typeface="Verdana"/>
-                <a:cs typeface="Verdana"/>
-              </a:rPr>
-              <a:t> </a:t>
-            </a:r>
-            <a:r>
-              <a:rPr lang="fr-FR" sz="2000" err="1">
-                <a:latin typeface="Verdana"/>
-                <a:cs typeface="Verdana"/>
-              </a:rPr>
-              <a:t>labeled</a:t>
-            </a:r>
-            <a:r>
-              <a:rPr lang="fr-FR" sz="2000">
-                <a:latin typeface="Verdana"/>
-                <a:cs typeface="Verdana"/>
-              </a:rPr>
-              <a:t> </a:t>
-            </a:r>
-            <a:r>
-              <a:rPr lang="fr-FR" sz="2000" err="1">
-                <a:latin typeface="Verdana"/>
-                <a:cs typeface="Verdana"/>
-              </a:rPr>
-              <a:t>samples</a:t>
-            </a:r>
-            <a:r>
-              <a:rPr lang="fr-FR" sz="2000">
-                <a:latin typeface="Verdana"/>
-                <a:cs typeface="Verdana"/>
-              </a:rPr>
-              <a:t>?</a:t>
-            </a:r>
-          </a:p>
-          <a:p>
-            <a:pPr lvl="1">
-              <a:spcBef>
-                <a:spcPts val="55"/>
-              </a:spcBef>
-            </a:pPr>
-            <a:r>
-              <a:rPr lang="fr-FR" sz="2000">
-                <a:solidFill>
-                  <a:srgbClr val="0070C0"/>
-                </a:solidFill>
-                <a:latin typeface="Verdana"/>
-                <a:cs typeface="Verdana"/>
-              </a:rPr>
-              <a:t>Transfer </a:t>
-            </a:r>
-            <a:r>
-              <a:rPr lang="fr-FR" sz="2000" err="1">
-                <a:solidFill>
-                  <a:srgbClr val="0070C0"/>
-                </a:solidFill>
-                <a:latin typeface="Verdana"/>
-                <a:cs typeface="Verdana"/>
-              </a:rPr>
-              <a:t>from</a:t>
-            </a:r>
-            <a:r>
-              <a:rPr lang="fr-FR" sz="2000">
-                <a:solidFill>
-                  <a:srgbClr val="0070C0"/>
-                </a:solidFill>
-                <a:latin typeface="Verdana"/>
-                <a:cs typeface="Verdana"/>
-              </a:rPr>
-              <a:t> </a:t>
-            </a:r>
-            <a:r>
-              <a:rPr lang="fr-FR" sz="2000" err="1">
-                <a:solidFill>
-                  <a:srgbClr val="0070C0"/>
-                </a:solidFill>
-                <a:latin typeface="Verdana"/>
-                <a:cs typeface="Verdana"/>
-              </a:rPr>
-              <a:t>similar</a:t>
-            </a:r>
-            <a:r>
-              <a:rPr lang="fr-FR" sz="2000">
-                <a:solidFill>
-                  <a:srgbClr val="0070C0"/>
-                </a:solidFill>
-                <a:latin typeface="Verdana"/>
-                <a:cs typeface="Verdana"/>
-              </a:rPr>
-              <a:t> </a:t>
-            </a:r>
-            <a:r>
-              <a:rPr lang="fr-FR" sz="2000" err="1">
-                <a:solidFill>
-                  <a:srgbClr val="0070C0"/>
-                </a:solidFill>
-                <a:latin typeface="Verdana"/>
-                <a:cs typeface="Verdana"/>
-              </a:rPr>
-              <a:t>tasks</a:t>
-            </a:r>
-            <a:endParaRPr lang="fr-FR" sz="2000">
-              <a:solidFill>
-                <a:srgbClr val="0070C0"/>
-              </a:solidFill>
-              <a:latin typeface="Verdana"/>
-              <a:cs typeface="Verdana"/>
-            </a:endParaRPr>
-          </a:p>
-          <a:p>
-            <a:pPr lvl="1">
-              <a:spcBef>
-                <a:spcPts val="55"/>
-              </a:spcBef>
-            </a:pPr>
-            <a:endParaRPr lang="fr-FR" sz="2000">
-              <a:solidFill>
-                <a:srgbClr val="0070C0"/>
-              </a:solidFill>
-              <a:latin typeface="Verdana"/>
-              <a:cs typeface="Verdana"/>
-            </a:endParaRPr>
-          </a:p>
-          <a:p>
-            <a:pPr marL="342900" indent="-342900">
-              <a:lnSpc>
-                <a:spcPct val="100000"/>
-              </a:lnSpc>
-              <a:spcBef>
-                <a:spcPts val="55"/>
-              </a:spcBef>
-              <a:buFont typeface="Arial" panose="020B0604020202020204" pitchFamily="34" charset="0"/>
-              <a:buChar char="•"/>
-            </a:pPr>
-            <a:r>
-              <a:rPr lang="fr-FR" sz="2000">
-                <a:latin typeface="Verdana"/>
-                <a:cs typeface="Verdana"/>
-              </a:rPr>
-              <a:t>Model performances </a:t>
-            </a:r>
-            <a:r>
-              <a:rPr lang="fr-FR" sz="2000" err="1">
-                <a:latin typeface="Verdana"/>
-                <a:cs typeface="Verdana"/>
-              </a:rPr>
-              <a:t>limited</a:t>
-            </a:r>
-            <a:r>
-              <a:rPr lang="fr-FR" sz="2000">
-                <a:latin typeface="Verdana"/>
-                <a:cs typeface="Verdana"/>
-              </a:rPr>
-              <a:t> </a:t>
-            </a:r>
-            <a:r>
-              <a:rPr lang="fr-FR" sz="2000" strike="sngStrike">
-                <a:latin typeface="Verdana"/>
-                <a:cs typeface="Verdana"/>
-              </a:rPr>
-              <a:t>by </a:t>
-            </a:r>
-            <a:r>
-              <a:rPr lang="fr-FR" sz="2000" strike="sngStrike" err="1">
-                <a:latin typeface="Verdana"/>
-                <a:cs typeface="Verdana"/>
-              </a:rPr>
-              <a:t>Number</a:t>
-            </a:r>
-            <a:r>
-              <a:rPr lang="fr-FR" sz="2000" strike="sngStrike">
-                <a:latin typeface="Verdana"/>
-                <a:cs typeface="Verdana"/>
-              </a:rPr>
-              <a:t> </a:t>
-            </a:r>
-            <a:r>
-              <a:rPr lang="fr-FR" sz="2000" strike="sngStrike" err="1">
-                <a:latin typeface="Verdana"/>
-                <a:cs typeface="Verdana"/>
-              </a:rPr>
-              <a:t>samples</a:t>
-            </a:r>
-            <a:endParaRPr lang="fr-FR" sz="2000" strike="sngStrike">
-              <a:latin typeface="Verdana"/>
-              <a:cs typeface="Verdana"/>
-            </a:endParaRPr>
-          </a:p>
-          <a:p>
-            <a:pPr lvl="1">
-              <a:spcBef>
-                <a:spcPts val="55"/>
-              </a:spcBef>
-            </a:pPr>
-            <a:r>
-              <a:rPr lang="fr-FR" sz="2000">
-                <a:solidFill>
-                  <a:srgbClr val="0070C0"/>
-                </a:solidFill>
-                <a:latin typeface="Verdana"/>
-                <a:cs typeface="Verdana"/>
-              </a:rPr>
-              <a:t>Limited by training </a:t>
-            </a:r>
-            <a:r>
-              <a:rPr lang="fr-FR" sz="2000" err="1">
-                <a:solidFill>
-                  <a:srgbClr val="0070C0"/>
-                </a:solidFill>
-                <a:latin typeface="Verdana"/>
-                <a:cs typeface="Verdana"/>
-              </a:rPr>
-              <a:t>cost</a:t>
-            </a:r>
-            <a:endParaRPr lang="fr-FR" sz="2000">
-              <a:solidFill>
-                <a:srgbClr val="0070C0"/>
-              </a:solidFill>
-              <a:latin typeface="Verdana"/>
-              <a:cs typeface="Verdana"/>
-            </a:endParaRPr>
-          </a:p>
-          <a:p>
-            <a:pPr lvl="1">
-              <a:spcBef>
-                <a:spcPts val="55"/>
-              </a:spcBef>
-            </a:pPr>
-            <a:endParaRPr lang="fr-FR" sz="2000">
-              <a:solidFill>
-                <a:srgbClr val="0070C0"/>
-              </a:solidFill>
-              <a:latin typeface="Verdana"/>
-              <a:cs typeface="Verdana"/>
-            </a:endParaRPr>
-          </a:p>
-        </p:txBody>
-      </p:sp>
-      <p:sp>
-        <p:nvSpPr>
-          <p:cNvPr id="3" name="Title 1">
-            <a:extLst>
-              <a:ext uri="{FF2B5EF4-FFF2-40B4-BE49-F238E27FC236}">
-                <a16:creationId xmlns:a16="http://schemas.microsoft.com/office/drawing/2014/main" id="{875725B8-E8DC-4204-81A5-7DCC3E98267B}"/>
-              </a:ext>
-            </a:extLst>
-          </p:cNvPr>
-          <p:cNvSpPr txBox="1">
-            <a:spLocks/>
-          </p:cNvSpPr>
-          <p:nvPr/>
-        </p:nvSpPr>
-        <p:spPr>
-          <a:xfrm>
-            <a:off x="839073" y="368284"/>
-            <a:ext cx="10526554" cy="1326944"/>
-          </a:xfrm>
-          <a:prstGeom prst="rect">
-            <a:avLst/>
-          </a:prstGeom>
-        </p:spPr>
-        <p:txBody>
-          <a:bodyPr/>
-          <a:lstStyle>
-            <a:lvl1pPr algn="l" defTabSz="914400" rtl="0" eaLnBrk="1" latinLnBrk="0" hangingPunct="1">
-              <a:lnSpc>
-                <a:spcPct val="90000"/>
-              </a:lnSpc>
-              <a:spcBef>
-                <a:spcPct val="0"/>
-              </a:spcBef>
-              <a:buNone/>
-              <a:defRPr sz="4400" kern="1200">
-                <a:solidFill>
-                  <a:schemeClr val="tx1"/>
-                </a:solidFill>
-                <a:latin typeface="+mj-lt"/>
-                <a:ea typeface="+mj-ea"/>
-                <a:cs typeface="+mj-cs"/>
-              </a:defRPr>
-            </a:lvl1pPr>
-          </a:lstStyle>
-          <a:p>
-            <a:r>
-              <a:rPr lang="en-US" sz="3600">
-                <a:latin typeface="Verdana" panose="020B0604030504040204" pitchFamily="34" charset="0"/>
-                <a:ea typeface="Verdana" panose="020B0604030504040204" pitchFamily="34" charset="0"/>
-              </a:rPr>
-              <a:t>Large scale ML</a:t>
-            </a:r>
-          </a:p>
-        </p:txBody>
-      </p:sp>
-    </p:spTree>
-    <p:extLst>
-      <p:ext uri="{BB962C8B-B14F-4D97-AF65-F5344CB8AC3E}">
-        <p14:creationId xmlns:p14="http://schemas.microsoft.com/office/powerpoint/2010/main" val="1934310155"/>
       </p:ext>
     </p:extLst>
   </p:cSld>

</xml_diff>